<commit_message>
Update apresentação esp8266 Login e conf.pptx
</commit_message>
<xml_diff>
--- a/esp8266/apresentação esp8266 Login e conf.pptx
+++ b/esp8266/apresentação esp8266 Login e conf.pptx
@@ -9,9 +9,8 @@
     <p:sldId id="257" r:id="rId6"/>
     <p:sldId id="258" r:id="rId7"/>
     <p:sldId id="259" r:id="rId8"/>
-    <p:sldId id="261" r:id="rId9"/>
-    <p:sldId id="262" r:id="rId10"/>
-    <p:sldId id="260" r:id="rId11"/>
+    <p:sldId id="262" r:id="rId9"/>
+    <p:sldId id="264" r:id="rId10"/>
   </p:sldIdLst>
   <p:sldSz cx="12192000" cy="6858000"/>
   <p:notesSz cx="6858000" cy="9144000"/>
@@ -129,6 +128,18 @@
 </p:presentation>
 </file>
 
+<file path=ppt/commentAuthors.xml><?xml version="1.0" encoding="utf-8"?>
+<p:cmAuthorLst xmlns:a="http://schemas.openxmlformats.org/drawingml/2006/main" xmlns:r="http://schemas.openxmlformats.org/officeDocument/2006/relationships" xmlns:p="http://schemas.openxmlformats.org/presentationml/2006/main">
+  <p:cmAuthor id="1" name="ALEXANDRE DOS SANTOS GONÇALVES" initials="ADSG" lastIdx="1" clrIdx="0">
+    <p:extLst>
+      <p:ext uri="{19B8F6BF-5375-455C-9EA6-DF929625EA0E}">
+        <p15:presenceInfo xmlns:p15="http://schemas.microsoft.com/office/powerpoint/2012/main" userId="ALEXANDRE DOS SANTOS GONÇALVES" providerId="None"/>
+      </p:ext>
+    </p:extLst>
+  </p:cmAuthor>
+</p:cmAuthorLst>
+</file>
+
 <file path=ppt/slideLayouts/slideLayout1.xml><?xml version="1.0" encoding="utf-8"?>
 <p:sldLayout xmlns:a="http://schemas.openxmlformats.org/drawingml/2006/main" xmlns:r="http://schemas.openxmlformats.org/officeDocument/2006/relationships" xmlns:p="http://schemas.openxmlformats.org/presentationml/2006/main" type="title" preserve="1">
   <p:cSld name="Slide de Título">
@@ -278,7 +289,7 @@
           <a:p>
             <a:fld id="{E6DE4FE1-47B9-4BC5-9080-CC2A501E35EC}" type="datetimeFigureOut">
               <a:rPr lang="en-US" smtClean="0"/>
-              <a:t>4/17/2021</a:t>
+              <a:t>4/19/2021</a:t>
             </a:fld>
             <a:endParaRPr lang="en-US"/>
           </a:p>
@@ -478,7 +489,7 @@
           <a:p>
             <a:fld id="{E6DE4FE1-47B9-4BC5-9080-CC2A501E35EC}" type="datetimeFigureOut">
               <a:rPr lang="en-US" smtClean="0"/>
-              <a:t>4/17/2021</a:t>
+              <a:t>4/19/2021</a:t>
             </a:fld>
             <a:endParaRPr lang="en-US"/>
           </a:p>
@@ -688,7 +699,7 @@
           <a:p>
             <a:fld id="{E6DE4FE1-47B9-4BC5-9080-CC2A501E35EC}" type="datetimeFigureOut">
               <a:rPr lang="en-US" smtClean="0"/>
-              <a:t>4/17/2021</a:t>
+              <a:t>4/19/2021</a:t>
             </a:fld>
             <a:endParaRPr lang="en-US"/>
           </a:p>
@@ -888,7 +899,7 @@
           <a:p>
             <a:fld id="{E6DE4FE1-47B9-4BC5-9080-CC2A501E35EC}" type="datetimeFigureOut">
               <a:rPr lang="en-US" smtClean="0"/>
-              <a:t>4/17/2021</a:t>
+              <a:t>4/19/2021</a:t>
             </a:fld>
             <a:endParaRPr lang="en-US"/>
           </a:p>
@@ -1164,7 +1175,7 @@
           <a:p>
             <a:fld id="{E6DE4FE1-47B9-4BC5-9080-CC2A501E35EC}" type="datetimeFigureOut">
               <a:rPr lang="en-US" smtClean="0"/>
-              <a:t>4/17/2021</a:t>
+              <a:t>4/19/2021</a:t>
             </a:fld>
             <a:endParaRPr lang="en-US"/>
           </a:p>
@@ -1432,7 +1443,7 @@
           <a:p>
             <a:fld id="{E6DE4FE1-47B9-4BC5-9080-CC2A501E35EC}" type="datetimeFigureOut">
               <a:rPr lang="en-US" smtClean="0"/>
-              <a:t>4/17/2021</a:t>
+              <a:t>4/19/2021</a:t>
             </a:fld>
             <a:endParaRPr lang="en-US"/>
           </a:p>
@@ -1847,7 +1858,7 @@
           <a:p>
             <a:fld id="{E6DE4FE1-47B9-4BC5-9080-CC2A501E35EC}" type="datetimeFigureOut">
               <a:rPr lang="en-US" smtClean="0"/>
-              <a:t>4/17/2021</a:t>
+              <a:t>4/19/2021</a:t>
             </a:fld>
             <a:endParaRPr lang="en-US"/>
           </a:p>
@@ -1989,7 +2000,7 @@
           <a:p>
             <a:fld id="{E6DE4FE1-47B9-4BC5-9080-CC2A501E35EC}" type="datetimeFigureOut">
               <a:rPr lang="en-US" smtClean="0"/>
-              <a:t>4/17/2021</a:t>
+              <a:t>4/19/2021</a:t>
             </a:fld>
             <a:endParaRPr lang="en-US"/>
           </a:p>
@@ -2102,7 +2113,7 @@
           <a:p>
             <a:fld id="{E6DE4FE1-47B9-4BC5-9080-CC2A501E35EC}" type="datetimeFigureOut">
               <a:rPr lang="en-US" smtClean="0"/>
-              <a:t>4/17/2021</a:t>
+              <a:t>4/19/2021</a:t>
             </a:fld>
             <a:endParaRPr lang="en-US"/>
           </a:p>
@@ -2415,7 +2426,7 @@
           <a:p>
             <a:fld id="{E6DE4FE1-47B9-4BC5-9080-CC2A501E35EC}" type="datetimeFigureOut">
               <a:rPr lang="en-US" smtClean="0"/>
-              <a:t>4/17/2021</a:t>
+              <a:t>4/19/2021</a:t>
             </a:fld>
             <a:endParaRPr lang="en-US"/>
           </a:p>
@@ -2704,7 +2715,7 @@
           <a:p>
             <a:fld id="{E6DE4FE1-47B9-4BC5-9080-CC2A501E35EC}" type="datetimeFigureOut">
               <a:rPr lang="en-US" smtClean="0"/>
-              <a:t>4/17/2021</a:t>
+              <a:t>4/19/2021</a:t>
             </a:fld>
             <a:endParaRPr lang="en-US"/>
           </a:p>
@@ -2950,7 +2961,7 @@
           <a:p>
             <a:fld id="{E6DE4FE1-47B9-4BC5-9080-CC2A501E35EC}" type="datetimeFigureOut">
               <a:rPr lang="en-US" smtClean="0"/>
-              <a:t>4/17/2021</a:t>
+              <a:t>4/19/2021</a:t>
             </a:fld>
             <a:endParaRPr lang="en-US"/>
           </a:p>
@@ -3369,10 +3380,10 @@
       </p:grpSpPr>
       <p:pic>
         <p:nvPicPr>
-          <p:cNvPr id="5" name="Imagem 4" descr="Interface gráfica do usuário, Aplicativo&#10;&#10;Descrição gerada automaticamente">
-            <a:extLst>
-              <a:ext uri="{FF2B5EF4-FFF2-40B4-BE49-F238E27FC236}">
-                <a16:creationId xmlns:a16="http://schemas.microsoft.com/office/drawing/2014/main" id="{22785BD8-FF4F-4454-86CA-598F2FD45ED2}"/>
+          <p:cNvPr id="3" name="Imagem 2" descr="Logotipo, nome da empresa&#10;&#10;Descrição gerada automaticamente">
+            <a:extLst>
+              <a:ext uri="{FF2B5EF4-FFF2-40B4-BE49-F238E27FC236}">
+                <a16:creationId xmlns:a16="http://schemas.microsoft.com/office/drawing/2014/main" id="{BF4402DD-B40E-4A65-8A0E-A63EE3E41066}"/>
               </a:ext>
             </a:extLst>
           </p:cNvPr>
@@ -3395,8 +3406,286 @@
         </p:blipFill>
         <p:spPr>
           <a:xfrm>
-            <a:off x="3795391" y="1347497"/>
-            <a:ext cx="4601217" cy="4163006"/>
+            <a:off x="4033045" y="720000"/>
+            <a:ext cx="4125910" cy="2160000"/>
+          </a:xfrm>
+          <a:prstGeom prst="rect">
+            <a:avLst/>
+          </a:prstGeom>
+        </p:spPr>
+      </p:pic>
+      <p:sp>
+        <p:nvSpPr>
+          <p:cNvPr id="6" name="Retângulo: Cantos Arredondados 5">
+            <a:extLst>
+              <a:ext uri="{FF2B5EF4-FFF2-40B4-BE49-F238E27FC236}">
+                <a16:creationId xmlns:a16="http://schemas.microsoft.com/office/drawing/2014/main" id="{398C372E-240E-4DA4-B758-17B8AA3E3BD4}"/>
+              </a:ext>
+            </a:extLst>
+          </p:cNvPr>
+          <p:cNvSpPr/>
+          <p:nvPr/>
+        </p:nvSpPr>
+        <p:spPr>
+          <a:xfrm>
+            <a:off x="4162926" y="2880000"/>
+            <a:ext cx="3866147" cy="2064505"/>
+          </a:xfrm>
+          <a:prstGeom prst="roundRect">
+            <a:avLst/>
+          </a:prstGeom>
+          <a:solidFill>
+            <a:schemeClr val="bg1">
+              <a:lumMod val="65000"/>
+            </a:schemeClr>
+          </a:solidFill>
+          <a:effectLst>
+            <a:softEdge rad="31750"/>
+          </a:effectLst>
+        </p:spPr>
+        <p:style>
+          <a:lnRef idx="2">
+            <a:schemeClr val="accent1">
+              <a:shade val="50000"/>
+            </a:schemeClr>
+          </a:lnRef>
+          <a:fillRef idx="1">
+            <a:schemeClr val="accent1"/>
+          </a:fillRef>
+          <a:effectRef idx="0">
+            <a:schemeClr val="accent1"/>
+          </a:effectRef>
+          <a:fontRef idx="minor">
+            <a:schemeClr val="lt1"/>
+          </a:fontRef>
+        </p:style>
+        <p:txBody>
+          <a:bodyPr rot="0" spcFirstLastPara="0" vertOverflow="overflow" horzOverflow="overflow" vert="horz" wrap="square" lIns="91440" tIns="45720" rIns="91440" bIns="45720" numCol="1" spcCol="0" rtlCol="0" fromWordArt="0" anchor="ctr" anchorCtr="0" forceAA="0" compatLnSpc="1">
+            <a:prstTxWarp prst="textNoShape">
+              <a:avLst/>
+            </a:prstTxWarp>
+            <a:noAutofit/>
+          </a:bodyPr>
+          <a:lstStyle/>
+          <a:p>
+            <a:pPr algn="ctr"/>
+            <a:endParaRPr lang="en-US" dirty="0"/>
+          </a:p>
+        </p:txBody>
+      </p:sp>
+      <p:sp>
+        <p:nvSpPr>
+          <p:cNvPr id="7" name="CaixaDeTexto 6">
+            <a:extLst>
+              <a:ext uri="{FF2B5EF4-FFF2-40B4-BE49-F238E27FC236}">
+                <a16:creationId xmlns:a16="http://schemas.microsoft.com/office/drawing/2014/main" id="{F32CEFB6-36BB-4B85-8F1D-F9BE23F7F4BC}"/>
+              </a:ext>
+            </a:extLst>
+          </p:cNvPr>
+          <p:cNvSpPr txBox="1"/>
+          <p:nvPr/>
+        </p:nvSpPr>
+        <p:spPr>
+          <a:xfrm>
+            <a:off x="4651213" y="3342210"/>
+            <a:ext cx="697832" cy="369332"/>
+          </a:xfrm>
+          <a:prstGeom prst="rect">
+            <a:avLst/>
+          </a:prstGeom>
+          <a:noFill/>
+        </p:spPr>
+        <p:txBody>
+          <a:bodyPr wrap="square" rtlCol="0">
+            <a:spAutoFit/>
+          </a:bodyPr>
+          <a:lstStyle/>
+          <a:p>
+            <a:r>
+              <a:rPr lang="pt-BR" dirty="0"/>
+              <a:t>Login</a:t>
+            </a:r>
+            <a:endParaRPr lang="en-US" dirty="0"/>
+          </a:p>
+        </p:txBody>
+      </p:sp>
+      <p:sp>
+        <p:nvSpPr>
+          <p:cNvPr id="8" name="CaixaDeTexto 7">
+            <a:extLst>
+              <a:ext uri="{FF2B5EF4-FFF2-40B4-BE49-F238E27FC236}">
+                <a16:creationId xmlns:a16="http://schemas.microsoft.com/office/drawing/2014/main" id="{1C7836BC-5BBE-4CA6-AB54-DF5089002D60}"/>
+              </a:ext>
+            </a:extLst>
+          </p:cNvPr>
+          <p:cNvSpPr txBox="1"/>
+          <p:nvPr/>
+        </p:nvSpPr>
+        <p:spPr>
+          <a:xfrm>
+            <a:off x="4592053" y="3727587"/>
+            <a:ext cx="756992" cy="369332"/>
+          </a:xfrm>
+          <a:prstGeom prst="rect">
+            <a:avLst/>
+          </a:prstGeom>
+          <a:noFill/>
+        </p:spPr>
+        <p:txBody>
+          <a:bodyPr wrap="square" rtlCol="0">
+            <a:spAutoFit/>
+          </a:bodyPr>
+          <a:lstStyle/>
+          <a:p>
+            <a:r>
+              <a:rPr lang="pt-BR" dirty="0"/>
+              <a:t>Senha</a:t>
+            </a:r>
+            <a:endParaRPr lang="en-US" dirty="0"/>
+          </a:p>
+        </p:txBody>
+      </p:sp>
+      <p:sp>
+        <p:nvSpPr>
+          <p:cNvPr id="12" name="Botão de Ação: Apagar 11">
+            <a:hlinkClick r:id="" action="ppaction://noaction" highlightClick="1"/>
+            <a:extLst>
+              <a:ext uri="{FF2B5EF4-FFF2-40B4-BE49-F238E27FC236}">
+                <a16:creationId xmlns:a16="http://schemas.microsoft.com/office/drawing/2014/main" id="{31796757-78B4-47E9-AEE2-263AFB18BAD6}"/>
+              </a:ext>
+            </a:extLst>
+          </p:cNvPr>
+          <p:cNvSpPr/>
+          <p:nvPr/>
+        </p:nvSpPr>
+        <p:spPr>
+          <a:xfrm>
+            <a:off x="5349045" y="3326165"/>
+            <a:ext cx="2266944" cy="274847"/>
+          </a:xfrm>
+          <a:prstGeom prst="actionButtonBlank">
+            <a:avLst/>
+          </a:prstGeom>
+          <a:solidFill>
+            <a:schemeClr val="bg1"/>
+          </a:solidFill>
+          <a:effectLst>
+            <a:softEdge rad="31750"/>
+          </a:effectLst>
+        </p:spPr>
+        <p:style>
+          <a:lnRef idx="2">
+            <a:schemeClr val="accent1">
+              <a:shade val="50000"/>
+            </a:schemeClr>
+          </a:lnRef>
+          <a:fillRef idx="1">
+            <a:schemeClr val="accent1"/>
+          </a:fillRef>
+          <a:effectRef idx="0">
+            <a:schemeClr val="accent1"/>
+          </a:effectRef>
+          <a:fontRef idx="minor">
+            <a:schemeClr val="lt1"/>
+          </a:fontRef>
+        </p:style>
+        <p:txBody>
+          <a:bodyPr rot="0" spcFirstLastPara="0" vertOverflow="overflow" horzOverflow="overflow" vert="horz" wrap="square" lIns="91440" tIns="45720" rIns="91440" bIns="45720" numCol="1" spcCol="0" rtlCol="0" fromWordArt="0" anchor="ctr" anchorCtr="0" forceAA="0" compatLnSpc="1">
+            <a:prstTxWarp prst="textNoShape">
+              <a:avLst/>
+            </a:prstTxWarp>
+            <a:noAutofit/>
+          </a:bodyPr>
+          <a:lstStyle/>
+          <a:p>
+            <a:pPr algn="ctr"/>
+            <a:endParaRPr lang="en-US"/>
+          </a:p>
+        </p:txBody>
+      </p:sp>
+      <p:sp>
+        <p:nvSpPr>
+          <p:cNvPr id="13" name="Botão de Ação: Apagar 12">
+            <a:hlinkClick r:id="" action="ppaction://noaction" highlightClick="1"/>
+            <a:extLst>
+              <a:ext uri="{FF2B5EF4-FFF2-40B4-BE49-F238E27FC236}">
+                <a16:creationId xmlns:a16="http://schemas.microsoft.com/office/drawing/2014/main" id="{4B1FB507-A09D-4CE9-91B7-870A942A93C5}"/>
+              </a:ext>
+            </a:extLst>
+          </p:cNvPr>
+          <p:cNvSpPr/>
+          <p:nvPr/>
+        </p:nvSpPr>
+        <p:spPr>
+          <a:xfrm>
+            <a:off x="5349045" y="3757458"/>
+            <a:ext cx="2266944" cy="258802"/>
+          </a:xfrm>
+          <a:prstGeom prst="actionButtonBlank">
+            <a:avLst/>
+          </a:prstGeom>
+          <a:solidFill>
+            <a:schemeClr val="bg1"/>
+          </a:solidFill>
+          <a:effectLst>
+            <a:softEdge rad="31750"/>
+          </a:effectLst>
+        </p:spPr>
+        <p:style>
+          <a:lnRef idx="2">
+            <a:schemeClr val="accent1">
+              <a:shade val="50000"/>
+            </a:schemeClr>
+          </a:lnRef>
+          <a:fillRef idx="1">
+            <a:schemeClr val="accent1"/>
+          </a:fillRef>
+          <a:effectRef idx="0">
+            <a:schemeClr val="accent1"/>
+          </a:effectRef>
+          <a:fontRef idx="minor">
+            <a:schemeClr val="lt1"/>
+          </a:fontRef>
+        </p:style>
+        <p:txBody>
+          <a:bodyPr rot="0" spcFirstLastPara="0" vertOverflow="overflow" horzOverflow="overflow" vert="horz" wrap="square" lIns="91440" tIns="45720" rIns="91440" bIns="45720" numCol="1" spcCol="0" rtlCol="0" fromWordArt="0" anchor="ctr" anchorCtr="0" forceAA="0" compatLnSpc="1">
+            <a:prstTxWarp prst="textNoShape">
+              <a:avLst/>
+            </a:prstTxWarp>
+            <a:noAutofit/>
+          </a:bodyPr>
+          <a:lstStyle/>
+          <a:p>
+            <a:pPr algn="ctr"/>
+            <a:endParaRPr lang="en-US"/>
+          </a:p>
+        </p:txBody>
+      </p:sp>
+      <p:pic>
+        <p:nvPicPr>
+          <p:cNvPr id="4" name="Imagem 3">
+            <a:hlinkClick r:id="rId3" action="ppaction://hlinksldjump"/>
+            <a:extLst>
+              <a:ext uri="{FF2B5EF4-FFF2-40B4-BE49-F238E27FC236}">
+                <a16:creationId xmlns:a16="http://schemas.microsoft.com/office/drawing/2014/main" id="{05A1EAB1-0282-42F4-8E32-F02458656373}"/>
+              </a:ext>
+            </a:extLst>
+          </p:cNvPr>
+          <p:cNvPicPr>
+            <a:picLocks noChangeAspect="1"/>
+          </p:cNvPicPr>
+          <p:nvPr/>
+        </p:nvPicPr>
+        <p:blipFill>
+          <a:blip r:embed="rId4"/>
+          <a:stretch>
+            <a:fillRect/>
+          </a:stretch>
+        </p:blipFill>
+        <p:spPr>
+          <a:xfrm>
+            <a:off x="5541216" y="4172706"/>
+            <a:ext cx="1109568" cy="542591"/>
           </a:xfrm>
           <a:prstGeom prst="rect">
             <a:avLst/>
@@ -3413,6 +3702,14 @@
   <p:clrMapOvr>
     <a:masterClrMapping/>
   </p:clrMapOvr>
+  <mc:AlternateContent xmlns:mc="http://schemas.openxmlformats.org/markup-compatibility/2006" xmlns:p14="http://schemas.microsoft.com/office/powerpoint/2010/main">
+    <mc:Choice Requires="p14">
+      <p:transition spd="slow" p14:dur="2000" advClick="0"/>
+    </mc:Choice>
+    <mc:Fallback xmlns="">
+      <p:transition spd="slow" advClick="0"/>
+    </mc:Fallback>
+  </mc:AlternateContent>
 </p:sld>
 </file>
 
@@ -3536,7 +3833,7 @@
       <p:sp>
         <p:nvSpPr>
           <p:cNvPr id="31" name="Botão de Ação: Apagar 30">
-            <a:hlinkClick r:id="" action="ppaction://noaction" highlightClick="1"/>
+            <a:hlinkClick r:id="rId3" action="ppaction://hlinksldjump" highlightClick="1"/>
             <a:extLst>
               <a:ext uri="{FF2B5EF4-FFF2-40B4-BE49-F238E27FC236}">
                 <a16:creationId xmlns:a16="http://schemas.microsoft.com/office/drawing/2014/main" id="{37C7D900-8CC2-4C75-A2CB-7EF8C9E04290}"/>
@@ -3548,7 +3845,7 @@
         </p:nvSpPr>
         <p:spPr>
           <a:xfrm>
-            <a:off x="3300000" y="3240000"/>
+            <a:off x="4770000" y="3220600"/>
             <a:ext cx="2668772" cy="1219835"/>
           </a:xfrm>
           <a:prstGeom prst="actionButtonBlank">
@@ -3599,11 +3896,11 @@
       </p:sp>
       <p:sp>
         <p:nvSpPr>
-          <p:cNvPr id="32" name="Botão de Ação: Apagar 31">
-            <a:hlinkClick r:id="" action="ppaction://noaction" highlightClick="1"/>
-            <a:extLst>
-              <a:ext uri="{FF2B5EF4-FFF2-40B4-BE49-F238E27FC236}">
-                <a16:creationId xmlns:a16="http://schemas.microsoft.com/office/drawing/2014/main" id="{74783D02-5993-46F4-A678-48E54FB41FAD}"/>
+          <p:cNvPr id="33" name="Botão de Ação: Apagar 32">
+            <a:hlinkClick r:id="rId4" action="ppaction://hlinksldjump" highlightClick="1"/>
+            <a:extLst>
+              <a:ext uri="{FF2B5EF4-FFF2-40B4-BE49-F238E27FC236}">
+                <a16:creationId xmlns:a16="http://schemas.microsoft.com/office/drawing/2014/main" id="{503390DA-E3E4-477A-A078-05FF26A15958}"/>
               </a:ext>
             </a:extLst>
           </p:cNvPr>
@@ -3612,7 +3909,7 @@
         </p:nvSpPr>
         <p:spPr>
           <a:xfrm>
-            <a:off x="6240000" y="3240000"/>
+            <a:off x="9180000" y="3240000"/>
             <a:ext cx="2668772" cy="1219835"/>
           </a:xfrm>
           <a:prstGeom prst="actionButtonBlank">
@@ -3648,14 +3945,14 @@
             <a:pPr algn="ctr"/>
             <a:r>
               <a:rPr lang="pt-BR" sz="1600" dirty="0"/>
-              <a:t>CADASTRO DE </a:t>
+              <a:t>CONFIGURAÇÃO </a:t>
             </a:r>
           </a:p>
           <a:p>
             <a:pPr algn="ctr"/>
             <a:r>
               <a:rPr lang="pt-BR" sz="1600" dirty="0"/>
-              <a:t>LOGIN</a:t>
+              <a:t>SENSORES</a:t>
             </a:r>
             <a:endParaRPr lang="en-US" sz="1600" dirty="0"/>
           </a:p>
@@ -3663,11 +3960,11 @@
       </p:sp>
       <p:sp>
         <p:nvSpPr>
-          <p:cNvPr id="33" name="Botão de Ação: Apagar 32">
-            <a:hlinkClick r:id="" action="ppaction://noaction" highlightClick="1"/>
-            <a:extLst>
-              <a:ext uri="{FF2B5EF4-FFF2-40B4-BE49-F238E27FC236}">
-                <a16:creationId xmlns:a16="http://schemas.microsoft.com/office/drawing/2014/main" id="{503390DA-E3E4-477A-A078-05FF26A15958}"/>
+          <p:cNvPr id="38" name="Retângulo 37">
+            <a:hlinkClick r:id="rId5" action="ppaction://hlinksldjump"/>
+            <a:extLst>
+              <a:ext uri="{FF2B5EF4-FFF2-40B4-BE49-F238E27FC236}">
+                <a16:creationId xmlns:a16="http://schemas.microsoft.com/office/drawing/2014/main" id="{FD6D7870-2BD4-4068-93F0-9556D691528E}"/>
               </a:ext>
             </a:extLst>
           </p:cNvPr>
@@ -3676,16 +3973,13 @@
         </p:nvSpPr>
         <p:spPr>
           <a:xfrm>
-            <a:off x="9180000" y="3240000"/>
-            <a:ext cx="2668772" cy="1219835"/>
-          </a:xfrm>
-          <a:prstGeom prst="actionButtonBlank">
+            <a:off x="5167309" y="5743575"/>
+            <a:ext cx="1857375" cy="742950"/>
+          </a:xfrm>
+          <a:prstGeom prst="rect">
             <a:avLst/>
           </a:prstGeom>
           <a:effectLst>
-            <a:outerShdw sx="1000" sy="1000" algn="ctr" rotWithShape="0">
-              <a:srgbClr val="000000"/>
-            </a:outerShdw>
             <a:softEdge rad="31750"/>
           </a:effectLst>
         </p:spPr>
@@ -3706,67 +4000,6 @@
           </a:fontRef>
         </p:style>
         <p:txBody>
-          <a:bodyPr rtlCol="0" anchor="ctr"/>
-          <a:lstStyle/>
-          <a:p>
-            <a:pPr algn="ctr"/>
-            <a:r>
-              <a:rPr lang="pt-BR" sz="1600" dirty="0"/>
-              <a:t>CONFIGURAÇÃO </a:t>
-            </a:r>
-          </a:p>
-          <a:p>
-            <a:pPr algn="ctr"/>
-            <a:r>
-              <a:rPr lang="pt-BR" sz="1600" dirty="0"/>
-              <a:t>SENSORES</a:t>
-            </a:r>
-            <a:endParaRPr lang="en-US" sz="1600" dirty="0"/>
-          </a:p>
-        </p:txBody>
-      </p:sp>
-      <p:sp>
-        <p:nvSpPr>
-          <p:cNvPr id="38" name="Retângulo 37">
-            <a:hlinkClick r:id="rId3" action="ppaction://hlinksldjump"/>
-            <a:extLst>
-              <a:ext uri="{FF2B5EF4-FFF2-40B4-BE49-F238E27FC236}">
-                <a16:creationId xmlns:a16="http://schemas.microsoft.com/office/drawing/2014/main" id="{FD6D7870-2BD4-4068-93F0-9556D691528E}"/>
-              </a:ext>
-            </a:extLst>
-          </p:cNvPr>
-          <p:cNvSpPr/>
-          <p:nvPr/>
-        </p:nvSpPr>
-        <p:spPr>
-          <a:xfrm>
-            <a:off x="5167309" y="5743575"/>
-            <a:ext cx="1857375" cy="742950"/>
-          </a:xfrm>
-          <a:prstGeom prst="rect">
-            <a:avLst/>
-          </a:prstGeom>
-          <a:effectLst>
-            <a:softEdge rad="31750"/>
-          </a:effectLst>
-        </p:spPr>
-        <p:style>
-          <a:lnRef idx="2">
-            <a:schemeClr val="accent1">
-              <a:shade val="50000"/>
-            </a:schemeClr>
-          </a:lnRef>
-          <a:fillRef idx="1">
-            <a:schemeClr val="accent1"/>
-          </a:fillRef>
-          <a:effectRef idx="0">
-            <a:schemeClr val="accent1"/>
-          </a:effectRef>
-          <a:fontRef idx="minor">
-            <a:schemeClr val="lt1"/>
-          </a:fontRef>
-        </p:style>
-        <p:txBody>
           <a:bodyPr rot="0" spcFirstLastPara="0" vertOverflow="overflow" horzOverflow="overflow" vert="horz" wrap="square" lIns="91440" tIns="45720" rIns="91440" bIns="45720" numCol="1" spcCol="0" rtlCol="0" fromWordArt="0" anchor="ctr" anchorCtr="0" forceAA="0" compatLnSpc="1">
             <a:prstTxWarp prst="textNoShape">
               <a:avLst/>
@@ -3794,11 +4027,11 @@
   <p:clrMapOvr>
     <a:masterClrMapping/>
   </p:clrMapOvr>
-  <mc:AlternateContent xmlns:mc="http://schemas.openxmlformats.org/markup-compatibility/2006">
-    <mc:Choice xmlns:p14="http://schemas.microsoft.com/office/powerpoint/2010/main" Requires="p14">
+  <mc:AlternateContent xmlns:mc="http://schemas.openxmlformats.org/markup-compatibility/2006" xmlns:p14="http://schemas.microsoft.com/office/powerpoint/2010/main">
+    <mc:Choice Requires="p14">
       <p:transition spd="slow" p14:dur="2000" advClick="0"/>
     </mc:Choice>
-    <mc:Fallback>
+    <mc:Fallback xmlns="">
       <p:transition spd="slow" advClick="0"/>
     </mc:Fallback>
   </mc:AlternateContent>
@@ -4561,11 +4794,11 @@
   <p:clrMapOvr>
     <a:masterClrMapping/>
   </p:clrMapOvr>
-  <mc:AlternateContent xmlns:mc="http://schemas.openxmlformats.org/markup-compatibility/2006">
-    <mc:Choice xmlns:p14="http://schemas.microsoft.com/office/powerpoint/2010/main" Requires="p14">
+  <mc:AlternateContent xmlns:mc="http://schemas.openxmlformats.org/markup-compatibility/2006" xmlns:p14="http://schemas.microsoft.com/office/powerpoint/2010/main">
+    <mc:Choice Requires="p14">
       <p:transition spd="slow" p14:dur="2000" advClick="0"/>
     </mc:Choice>
-    <mc:Fallback>
+    <mc:Fallback xmlns="">
       <p:transition spd="slow" advClick="0"/>
     </mc:Fallback>
   </mc:AlternateContent>
@@ -4625,6 +4858,630 @@
           </a:prstGeom>
         </p:spPr>
       </p:pic>
+      <p:sp>
+        <p:nvSpPr>
+          <p:cNvPr id="3" name="Retângulo: Cantos Arredondados 2">
+            <a:extLst>
+              <a:ext uri="{FF2B5EF4-FFF2-40B4-BE49-F238E27FC236}">
+                <a16:creationId xmlns:a16="http://schemas.microsoft.com/office/drawing/2014/main" id="{B519161A-C841-46F0-9285-DEA82C30A51D}"/>
+              </a:ext>
+            </a:extLst>
+          </p:cNvPr>
+          <p:cNvSpPr/>
+          <p:nvPr/>
+        </p:nvSpPr>
+        <p:spPr>
+          <a:xfrm>
+            <a:off x="2016000" y="2700000"/>
+            <a:ext cx="8421664" cy="2952000"/>
+          </a:xfrm>
+          <a:prstGeom prst="roundRect">
+            <a:avLst>
+              <a:gd name="adj" fmla="val 16667"/>
+            </a:avLst>
+          </a:prstGeom>
+          <a:solidFill>
+            <a:schemeClr val="bg1">
+              <a:lumMod val="65000"/>
+            </a:schemeClr>
+          </a:solidFill>
+          <a:effectLst>
+            <a:softEdge rad="31750"/>
+          </a:effectLst>
+        </p:spPr>
+        <p:style>
+          <a:lnRef idx="2">
+            <a:schemeClr val="accent1">
+              <a:shade val="50000"/>
+            </a:schemeClr>
+          </a:lnRef>
+          <a:fillRef idx="1">
+            <a:schemeClr val="accent1"/>
+          </a:fillRef>
+          <a:effectRef idx="0">
+            <a:schemeClr val="accent1"/>
+          </a:effectRef>
+          <a:fontRef idx="minor">
+            <a:schemeClr val="lt1"/>
+          </a:fontRef>
+        </p:style>
+        <p:txBody>
+          <a:bodyPr rot="0" spcFirstLastPara="0" vertOverflow="overflow" horzOverflow="overflow" vert="horz" wrap="square" lIns="91440" tIns="45720" rIns="91440" bIns="45720" numCol="1" spcCol="0" rtlCol="0" fromWordArt="0" anchor="ctr" anchorCtr="0" forceAA="0" compatLnSpc="1">
+            <a:prstTxWarp prst="textNoShape">
+              <a:avLst/>
+            </a:prstTxWarp>
+            <a:noAutofit/>
+          </a:bodyPr>
+          <a:lstStyle/>
+          <a:p>
+            <a:pPr algn="ctr"/>
+            <a:endParaRPr lang="en-US" dirty="0"/>
+          </a:p>
+        </p:txBody>
+      </p:sp>
+      <p:sp>
+        <p:nvSpPr>
+          <p:cNvPr id="4" name="CaixaDeTexto 3">
+            <a:extLst>
+              <a:ext uri="{FF2B5EF4-FFF2-40B4-BE49-F238E27FC236}">
+                <a16:creationId xmlns:a16="http://schemas.microsoft.com/office/drawing/2014/main" id="{BF83082B-9F13-4093-BD07-042D586DC080}"/>
+              </a:ext>
+            </a:extLst>
+          </p:cNvPr>
+          <p:cNvSpPr txBox="1"/>
+          <p:nvPr/>
+        </p:nvSpPr>
+        <p:spPr>
+          <a:xfrm>
+            <a:off x="2679778" y="2932919"/>
+            <a:ext cx="2201757" cy="338554"/>
+          </a:xfrm>
+          <a:prstGeom prst="rect">
+            <a:avLst/>
+          </a:prstGeom>
+          <a:noFill/>
+        </p:spPr>
+        <p:txBody>
+          <a:bodyPr wrap="square" rtlCol="0">
+            <a:spAutoFit/>
+          </a:bodyPr>
+          <a:lstStyle/>
+          <a:p>
+            <a:r>
+              <a:rPr lang="pt-BR" sz="1600" dirty="0"/>
+              <a:t>NOME DO DISPOSITIVO:</a:t>
+            </a:r>
+            <a:endParaRPr lang="en-US" sz="1600" dirty="0"/>
+          </a:p>
+        </p:txBody>
+      </p:sp>
+      <p:sp>
+        <p:nvSpPr>
+          <p:cNvPr id="6" name="CaixaDeTexto 5">
+            <a:extLst>
+              <a:ext uri="{FF2B5EF4-FFF2-40B4-BE49-F238E27FC236}">
+                <a16:creationId xmlns:a16="http://schemas.microsoft.com/office/drawing/2014/main" id="{6B2CA225-DC59-4E98-9157-E8942A56C61E}"/>
+              </a:ext>
+            </a:extLst>
+          </p:cNvPr>
+          <p:cNvSpPr txBox="1"/>
+          <p:nvPr/>
+        </p:nvSpPr>
+        <p:spPr>
+          <a:xfrm>
+            <a:off x="4417370" y="3367212"/>
+            <a:ext cx="396262" cy="338554"/>
+          </a:xfrm>
+          <a:prstGeom prst="rect">
+            <a:avLst/>
+          </a:prstGeom>
+          <a:noFill/>
+        </p:spPr>
+        <p:txBody>
+          <a:bodyPr wrap="none" rtlCol="0">
+            <a:spAutoFit/>
+          </a:bodyPr>
+          <a:lstStyle/>
+          <a:p>
+            <a:r>
+              <a:rPr lang="pt-BR" sz="1600" dirty="0"/>
+              <a:t>IP:</a:t>
+            </a:r>
+            <a:endParaRPr lang="en-US" sz="1600" dirty="0"/>
+          </a:p>
+        </p:txBody>
+      </p:sp>
+      <p:sp>
+        <p:nvSpPr>
+          <p:cNvPr id="7" name="CaixaDeTexto 6">
+            <a:extLst>
+              <a:ext uri="{FF2B5EF4-FFF2-40B4-BE49-F238E27FC236}">
+                <a16:creationId xmlns:a16="http://schemas.microsoft.com/office/drawing/2014/main" id="{1CB879D5-B505-4F27-8D9B-0EB20F9D4292}"/>
+              </a:ext>
+            </a:extLst>
+          </p:cNvPr>
+          <p:cNvSpPr txBox="1"/>
+          <p:nvPr/>
+        </p:nvSpPr>
+        <p:spPr>
+          <a:xfrm>
+            <a:off x="4077533" y="3801505"/>
+            <a:ext cx="736099" cy="338554"/>
+          </a:xfrm>
+          <a:prstGeom prst="rect">
+            <a:avLst/>
+          </a:prstGeom>
+          <a:noFill/>
+        </p:spPr>
+        <p:txBody>
+          <a:bodyPr wrap="none" rtlCol="0">
+            <a:spAutoFit/>
+          </a:bodyPr>
+          <a:lstStyle/>
+          <a:p>
+            <a:r>
+              <a:rPr lang="pt-BR" sz="1600" dirty="0"/>
+              <a:t>MASC:</a:t>
+            </a:r>
+            <a:endParaRPr lang="en-US" sz="1600" dirty="0"/>
+          </a:p>
+        </p:txBody>
+      </p:sp>
+      <p:sp>
+        <p:nvSpPr>
+          <p:cNvPr id="8" name="CaixaDeTexto 7">
+            <a:extLst>
+              <a:ext uri="{FF2B5EF4-FFF2-40B4-BE49-F238E27FC236}">
+                <a16:creationId xmlns:a16="http://schemas.microsoft.com/office/drawing/2014/main" id="{F9D22395-69A8-4E01-89F1-72FA71453384}"/>
+              </a:ext>
+            </a:extLst>
+          </p:cNvPr>
+          <p:cNvSpPr txBox="1"/>
+          <p:nvPr/>
+        </p:nvSpPr>
+        <p:spPr>
+          <a:xfrm>
+            <a:off x="3780657" y="4235798"/>
+            <a:ext cx="1032975" cy="338554"/>
+          </a:xfrm>
+          <a:prstGeom prst="rect">
+            <a:avLst/>
+          </a:prstGeom>
+          <a:noFill/>
+        </p:spPr>
+        <p:txBody>
+          <a:bodyPr wrap="none" rtlCol="0">
+            <a:spAutoFit/>
+          </a:bodyPr>
+          <a:lstStyle/>
+          <a:p>
+            <a:r>
+              <a:rPr lang="pt-BR" sz="1600" dirty="0"/>
+              <a:t>GATEWAY:</a:t>
+            </a:r>
+            <a:endParaRPr lang="en-US" sz="1600" dirty="0"/>
+          </a:p>
+        </p:txBody>
+      </p:sp>
+      <p:sp>
+        <p:nvSpPr>
+          <p:cNvPr id="9" name="CaixaDeTexto 8">
+            <a:extLst>
+              <a:ext uri="{FF2B5EF4-FFF2-40B4-BE49-F238E27FC236}">
+                <a16:creationId xmlns:a16="http://schemas.microsoft.com/office/drawing/2014/main" id="{856EC19B-5AD7-4B05-95B3-C67F095E3CC9}"/>
+              </a:ext>
+            </a:extLst>
+          </p:cNvPr>
+          <p:cNvSpPr txBox="1"/>
+          <p:nvPr/>
+        </p:nvSpPr>
+        <p:spPr>
+          <a:xfrm>
+            <a:off x="3339574" y="4670091"/>
+            <a:ext cx="1474058" cy="338554"/>
+          </a:xfrm>
+          <a:prstGeom prst="rect">
+            <a:avLst/>
+          </a:prstGeom>
+          <a:noFill/>
+        </p:spPr>
+        <p:txBody>
+          <a:bodyPr wrap="none" rtlCol="0">
+            <a:spAutoFit/>
+          </a:bodyPr>
+          <a:lstStyle/>
+          <a:p>
+            <a:r>
+              <a:rPr lang="pt-BR" sz="1600" dirty="0"/>
+              <a:t>LUZ DE STATUS:</a:t>
+            </a:r>
+            <a:endParaRPr lang="en-US" sz="1600" dirty="0"/>
+          </a:p>
+        </p:txBody>
+      </p:sp>
+      <p:sp>
+        <p:nvSpPr>
+          <p:cNvPr id="19" name="CaixaDeTexto 18">
+            <a:extLst>
+              <a:ext uri="{FF2B5EF4-FFF2-40B4-BE49-F238E27FC236}">
+                <a16:creationId xmlns:a16="http://schemas.microsoft.com/office/drawing/2014/main" id="{7599A22C-D5D0-4D5A-8917-05AEB51F32B7}"/>
+              </a:ext>
+            </a:extLst>
+          </p:cNvPr>
+          <p:cNvSpPr txBox="1"/>
+          <p:nvPr/>
+        </p:nvSpPr>
+        <p:spPr>
+          <a:xfrm>
+            <a:off x="3895725" y="5092779"/>
+            <a:ext cx="960847" cy="338554"/>
+          </a:xfrm>
+          <a:prstGeom prst="rect">
+            <a:avLst/>
+          </a:prstGeom>
+          <a:noFill/>
+        </p:spPr>
+        <p:txBody>
+          <a:bodyPr wrap="square" rtlCol="0">
+            <a:spAutoFit/>
+          </a:bodyPr>
+          <a:lstStyle/>
+          <a:p>
+            <a:r>
+              <a:rPr lang="pt-BR" sz="1600" dirty="0"/>
+              <a:t>SENSOR:</a:t>
+            </a:r>
+            <a:endParaRPr lang="en-US" sz="1600" dirty="0"/>
+          </a:p>
+        </p:txBody>
+      </p:sp>
+      <p:sp>
+        <p:nvSpPr>
+          <p:cNvPr id="2" name="CaixaDeTexto 1">
+            <a:extLst>
+              <a:ext uri="{FF2B5EF4-FFF2-40B4-BE49-F238E27FC236}">
+                <a16:creationId xmlns:a16="http://schemas.microsoft.com/office/drawing/2014/main" id="{3031DA1A-5606-4940-A6D8-7A2E22E4D8FB}"/>
+              </a:ext>
+            </a:extLst>
+          </p:cNvPr>
+          <p:cNvSpPr txBox="1"/>
+          <p:nvPr/>
+        </p:nvSpPr>
+        <p:spPr>
+          <a:xfrm>
+            <a:off x="4881535" y="2917530"/>
+            <a:ext cx="1497013" cy="369332"/>
+          </a:xfrm>
+          <a:prstGeom prst="rect">
+            <a:avLst/>
+          </a:prstGeom>
+          <a:noFill/>
+        </p:spPr>
+        <p:txBody>
+          <a:bodyPr wrap="none" rtlCol="0">
+            <a:spAutoFit/>
+          </a:bodyPr>
+          <a:lstStyle/>
+          <a:p>
+            <a:r>
+              <a:rPr lang="pt-BR" dirty="0"/>
+              <a:t>Dispositivo 01</a:t>
+            </a:r>
+            <a:endParaRPr lang="en-US" dirty="0"/>
+          </a:p>
+        </p:txBody>
+      </p:sp>
+      <p:sp>
+        <p:nvSpPr>
+          <p:cNvPr id="20" name="CaixaDeTexto 19">
+            <a:extLst>
+              <a:ext uri="{FF2B5EF4-FFF2-40B4-BE49-F238E27FC236}">
+                <a16:creationId xmlns:a16="http://schemas.microsoft.com/office/drawing/2014/main" id="{219ED2A5-DFED-4B3D-9319-60F78395FE19}"/>
+              </a:ext>
+            </a:extLst>
+          </p:cNvPr>
+          <p:cNvSpPr txBox="1"/>
+          <p:nvPr/>
+        </p:nvSpPr>
+        <p:spPr>
+          <a:xfrm>
+            <a:off x="4881535" y="3355760"/>
+            <a:ext cx="1527982" cy="369332"/>
+          </a:xfrm>
+          <a:prstGeom prst="rect">
+            <a:avLst/>
+          </a:prstGeom>
+          <a:noFill/>
+        </p:spPr>
+        <p:txBody>
+          <a:bodyPr wrap="none" rtlCol="0">
+            <a:spAutoFit/>
+          </a:bodyPr>
+          <a:lstStyle/>
+          <a:p>
+            <a:r>
+              <a:rPr lang="pt-BR" dirty="0"/>
+              <a:t>192.168.0.101</a:t>
+            </a:r>
+            <a:endParaRPr lang="en-US" dirty="0"/>
+          </a:p>
+        </p:txBody>
+      </p:sp>
+      <p:sp>
+        <p:nvSpPr>
+          <p:cNvPr id="21" name="CaixaDeTexto 20">
+            <a:extLst>
+              <a:ext uri="{FF2B5EF4-FFF2-40B4-BE49-F238E27FC236}">
+                <a16:creationId xmlns:a16="http://schemas.microsoft.com/office/drawing/2014/main" id="{F2E0BF44-338D-4E0E-ACA5-383432405377}"/>
+              </a:ext>
+            </a:extLst>
+          </p:cNvPr>
+          <p:cNvSpPr txBox="1"/>
+          <p:nvPr/>
+        </p:nvSpPr>
+        <p:spPr>
+          <a:xfrm>
+            <a:off x="4859043" y="3789900"/>
+            <a:ext cx="1585690" cy="369332"/>
+          </a:xfrm>
+          <a:prstGeom prst="rect">
+            <a:avLst/>
+          </a:prstGeom>
+          <a:noFill/>
+        </p:spPr>
+        <p:txBody>
+          <a:bodyPr wrap="none" rtlCol="0">
+            <a:spAutoFit/>
+          </a:bodyPr>
+          <a:lstStyle/>
+          <a:p>
+            <a:r>
+              <a:rPr lang="pt-BR" dirty="0"/>
+              <a:t>255.255.255.0</a:t>
+            </a:r>
+            <a:endParaRPr lang="en-US" dirty="0"/>
+          </a:p>
+        </p:txBody>
+      </p:sp>
+      <p:sp>
+        <p:nvSpPr>
+          <p:cNvPr id="22" name="CaixaDeTexto 21">
+            <a:extLst>
+              <a:ext uri="{FF2B5EF4-FFF2-40B4-BE49-F238E27FC236}">
+                <a16:creationId xmlns:a16="http://schemas.microsoft.com/office/drawing/2014/main" id="{66A96B46-F9C1-4BDC-A4BA-D615974C4A3B}"/>
+              </a:ext>
+            </a:extLst>
+          </p:cNvPr>
+          <p:cNvSpPr txBox="1"/>
+          <p:nvPr/>
+        </p:nvSpPr>
+        <p:spPr>
+          <a:xfrm>
+            <a:off x="4856572" y="4205020"/>
+            <a:ext cx="1293944" cy="369332"/>
+          </a:xfrm>
+          <a:prstGeom prst="rect">
+            <a:avLst/>
+          </a:prstGeom>
+          <a:noFill/>
+        </p:spPr>
+        <p:txBody>
+          <a:bodyPr wrap="none" rtlCol="0">
+            <a:spAutoFit/>
+          </a:bodyPr>
+          <a:lstStyle/>
+          <a:p>
+            <a:r>
+              <a:rPr lang="pt-BR" dirty="0"/>
+              <a:t>192.168.0.1</a:t>
+            </a:r>
+            <a:endParaRPr lang="en-US" dirty="0"/>
+          </a:p>
+        </p:txBody>
+      </p:sp>
+      <p:sp>
+        <p:nvSpPr>
+          <p:cNvPr id="23" name="CaixaDeTexto 22">
+            <a:extLst>
+              <a:ext uri="{FF2B5EF4-FFF2-40B4-BE49-F238E27FC236}">
+                <a16:creationId xmlns:a16="http://schemas.microsoft.com/office/drawing/2014/main" id="{FD0021CC-18B5-4EB2-9712-EF7FF92529FD}"/>
+              </a:ext>
+            </a:extLst>
+          </p:cNvPr>
+          <p:cNvSpPr txBox="1"/>
+          <p:nvPr/>
+        </p:nvSpPr>
+        <p:spPr>
+          <a:xfrm>
+            <a:off x="4881535" y="4634992"/>
+            <a:ext cx="545342" cy="369332"/>
+          </a:xfrm>
+          <a:prstGeom prst="rect">
+            <a:avLst/>
+          </a:prstGeom>
+          <a:noFill/>
+        </p:spPr>
+        <p:txBody>
+          <a:bodyPr wrap="none" rtlCol="0">
+            <a:spAutoFit/>
+          </a:bodyPr>
+          <a:lstStyle/>
+          <a:p>
+            <a:r>
+              <a:rPr lang="pt-BR" dirty="0"/>
+              <a:t>SIM</a:t>
+            </a:r>
+            <a:endParaRPr lang="en-US" dirty="0"/>
+          </a:p>
+        </p:txBody>
+      </p:sp>
+      <p:sp>
+        <p:nvSpPr>
+          <p:cNvPr id="24" name="CaixaDeTexto 23">
+            <a:extLst>
+              <a:ext uri="{FF2B5EF4-FFF2-40B4-BE49-F238E27FC236}">
+                <a16:creationId xmlns:a16="http://schemas.microsoft.com/office/drawing/2014/main" id="{6214DD03-338A-47BB-A51E-AF1B3DC7725E}"/>
+              </a:ext>
+            </a:extLst>
+          </p:cNvPr>
+          <p:cNvSpPr txBox="1"/>
+          <p:nvPr/>
+        </p:nvSpPr>
+        <p:spPr>
+          <a:xfrm>
+            <a:off x="4856572" y="5047597"/>
+            <a:ext cx="1011815" cy="369332"/>
+          </a:xfrm>
+          <a:prstGeom prst="rect">
+            <a:avLst/>
+          </a:prstGeom>
+          <a:noFill/>
+        </p:spPr>
+        <p:txBody>
+          <a:bodyPr wrap="none" rtlCol="0">
+            <a:spAutoFit/>
+          </a:bodyPr>
+          <a:lstStyle/>
+          <a:p>
+            <a:r>
+              <a:rPr lang="pt-BR" dirty="0"/>
+              <a:t>TEMP 01</a:t>
+            </a:r>
+            <a:endParaRPr lang="en-US" dirty="0"/>
+          </a:p>
+        </p:txBody>
+      </p:sp>
+      <p:sp>
+        <p:nvSpPr>
+          <p:cNvPr id="25" name="Retângulo 24">
+            <a:hlinkClick r:id="rId3" action="ppaction://hlinksldjump"/>
+            <a:extLst>
+              <a:ext uri="{FF2B5EF4-FFF2-40B4-BE49-F238E27FC236}">
+                <a16:creationId xmlns:a16="http://schemas.microsoft.com/office/drawing/2014/main" id="{7DB8D7AD-6C52-4514-9897-80D363668370}"/>
+              </a:ext>
+            </a:extLst>
+          </p:cNvPr>
+          <p:cNvSpPr/>
+          <p:nvPr/>
+        </p:nvSpPr>
+        <p:spPr>
+          <a:xfrm>
+            <a:off x="5167312" y="5798952"/>
+            <a:ext cx="1857375" cy="742950"/>
+          </a:xfrm>
+          <a:prstGeom prst="rect">
+            <a:avLst/>
+          </a:prstGeom>
+          <a:effectLst>
+            <a:softEdge rad="31750"/>
+          </a:effectLst>
+        </p:spPr>
+        <p:style>
+          <a:lnRef idx="2">
+            <a:schemeClr val="accent1">
+              <a:shade val="50000"/>
+            </a:schemeClr>
+          </a:lnRef>
+          <a:fillRef idx="1">
+            <a:schemeClr val="accent1"/>
+          </a:fillRef>
+          <a:effectRef idx="0">
+            <a:schemeClr val="accent1"/>
+          </a:effectRef>
+          <a:fontRef idx="minor">
+            <a:schemeClr val="lt1"/>
+          </a:fontRef>
+        </p:style>
+        <p:txBody>
+          <a:bodyPr rot="0" spcFirstLastPara="0" vertOverflow="overflow" horzOverflow="overflow" vert="horz" wrap="square" lIns="91440" tIns="45720" rIns="91440" bIns="45720" numCol="1" spcCol="0" rtlCol="0" fromWordArt="0" anchor="ctr" anchorCtr="0" forceAA="0" compatLnSpc="1">
+            <a:prstTxWarp prst="textNoShape">
+              <a:avLst/>
+            </a:prstTxWarp>
+            <a:noAutofit/>
+          </a:bodyPr>
+          <a:lstStyle/>
+          <a:p>
+            <a:pPr algn="ctr"/>
+            <a:r>
+              <a:rPr lang="pt-BR" dirty="0"/>
+              <a:t>VOLTAR</a:t>
+            </a:r>
+            <a:endParaRPr lang="en-US" dirty="0"/>
+          </a:p>
+        </p:txBody>
+      </p:sp>
+      <p:sp>
+        <p:nvSpPr>
+          <p:cNvPr id="26" name="CaixaDeTexto 25">
+            <a:extLst>
+              <a:ext uri="{FF2B5EF4-FFF2-40B4-BE49-F238E27FC236}">
+                <a16:creationId xmlns:a16="http://schemas.microsoft.com/office/drawing/2014/main" id="{D1186AAA-C9AA-4923-B43A-1A8EA0416E99}"/>
+              </a:ext>
+            </a:extLst>
+          </p:cNvPr>
+          <p:cNvSpPr txBox="1"/>
+          <p:nvPr/>
+        </p:nvSpPr>
+        <p:spPr>
+          <a:xfrm>
+            <a:off x="8799922" y="5033193"/>
+            <a:ext cx="673582" cy="369332"/>
+          </a:xfrm>
+          <a:prstGeom prst="rect">
+            <a:avLst/>
+          </a:prstGeom>
+          <a:noFill/>
+        </p:spPr>
+        <p:txBody>
+          <a:bodyPr wrap="none" rtlCol="0">
+            <a:spAutoFit/>
+          </a:bodyPr>
+          <a:lstStyle/>
+          <a:p>
+            <a:r>
+              <a:rPr lang="pt-BR" dirty="0"/>
+              <a:t>25 °C</a:t>
+            </a:r>
+            <a:endParaRPr lang="en-US" dirty="0"/>
+          </a:p>
+        </p:txBody>
+      </p:sp>
+      <p:sp>
+        <p:nvSpPr>
+          <p:cNvPr id="27" name="CaixaDeTexto 26">
+            <a:extLst>
+              <a:ext uri="{FF2B5EF4-FFF2-40B4-BE49-F238E27FC236}">
+                <a16:creationId xmlns:a16="http://schemas.microsoft.com/office/drawing/2014/main" id="{096D5C78-D290-4C32-BB61-C4FBF5AA1077}"/>
+              </a:ext>
+            </a:extLst>
+          </p:cNvPr>
+          <p:cNvSpPr txBox="1"/>
+          <p:nvPr/>
+        </p:nvSpPr>
+        <p:spPr>
+          <a:xfrm>
+            <a:off x="7125513" y="5078375"/>
+            <a:ext cx="1585690" cy="338554"/>
+          </a:xfrm>
+          <a:prstGeom prst="rect">
+            <a:avLst/>
+          </a:prstGeom>
+          <a:noFill/>
+        </p:spPr>
+        <p:txBody>
+          <a:bodyPr wrap="square" rtlCol="0">
+            <a:spAutoFit/>
+          </a:bodyPr>
+          <a:lstStyle/>
+          <a:p>
+            <a:r>
+              <a:rPr lang="pt-BR" sz="1600" dirty="0"/>
+              <a:t>TEMPERATURA:</a:t>
+            </a:r>
+            <a:endParaRPr lang="en-US" sz="1600" dirty="0"/>
+          </a:p>
+        </p:txBody>
+      </p:sp>
     </p:spTree>
     <p:extLst>
       <p:ext uri="{BB962C8B-B14F-4D97-AF65-F5344CB8AC3E}">
@@ -4691,10 +5548,618 @@
           </a:prstGeom>
         </p:spPr>
       </p:pic>
+      <p:sp>
+        <p:nvSpPr>
+          <p:cNvPr id="3" name="Retângulo: Cantos Arredondados 2">
+            <a:extLst>
+              <a:ext uri="{FF2B5EF4-FFF2-40B4-BE49-F238E27FC236}">
+                <a16:creationId xmlns:a16="http://schemas.microsoft.com/office/drawing/2014/main" id="{B4E57B04-7B02-4D0C-B076-BCCAD1B49C27}"/>
+              </a:ext>
+            </a:extLst>
+          </p:cNvPr>
+          <p:cNvSpPr/>
+          <p:nvPr/>
+        </p:nvSpPr>
+        <p:spPr>
+          <a:xfrm>
+            <a:off x="2038350" y="2700000"/>
+            <a:ext cx="8421664" cy="2702579"/>
+          </a:xfrm>
+          <a:prstGeom prst="roundRect">
+            <a:avLst/>
+          </a:prstGeom>
+          <a:solidFill>
+            <a:schemeClr val="bg1">
+              <a:lumMod val="65000"/>
+            </a:schemeClr>
+          </a:solidFill>
+          <a:effectLst>
+            <a:softEdge rad="31750"/>
+          </a:effectLst>
+        </p:spPr>
+        <p:style>
+          <a:lnRef idx="2">
+            <a:schemeClr val="accent1">
+              <a:shade val="50000"/>
+            </a:schemeClr>
+          </a:lnRef>
+          <a:fillRef idx="1">
+            <a:schemeClr val="accent1"/>
+          </a:fillRef>
+          <a:effectRef idx="0">
+            <a:schemeClr val="accent1"/>
+          </a:effectRef>
+          <a:fontRef idx="minor">
+            <a:schemeClr val="lt1"/>
+          </a:fontRef>
+        </p:style>
+        <p:txBody>
+          <a:bodyPr rot="0" spcFirstLastPara="0" vertOverflow="overflow" horzOverflow="overflow" vert="horz" wrap="square" lIns="91440" tIns="45720" rIns="91440" bIns="45720" numCol="1" spcCol="0" rtlCol="0" fromWordArt="0" anchor="ctr" anchorCtr="0" forceAA="0" compatLnSpc="1">
+            <a:prstTxWarp prst="textNoShape">
+              <a:avLst/>
+            </a:prstTxWarp>
+            <a:noAutofit/>
+          </a:bodyPr>
+          <a:lstStyle/>
+          <a:p>
+            <a:pPr algn="ctr"/>
+            <a:endParaRPr lang="en-US" dirty="0"/>
+          </a:p>
+        </p:txBody>
+      </p:sp>
+      <p:sp>
+        <p:nvSpPr>
+          <p:cNvPr id="4" name="CaixaDeTexto 3">
+            <a:extLst>
+              <a:ext uri="{FF2B5EF4-FFF2-40B4-BE49-F238E27FC236}">
+                <a16:creationId xmlns:a16="http://schemas.microsoft.com/office/drawing/2014/main" id="{2E3F1AEF-A774-47AF-8D05-4E2241FA1C6E}"/>
+              </a:ext>
+            </a:extLst>
+          </p:cNvPr>
+          <p:cNvSpPr txBox="1"/>
+          <p:nvPr/>
+        </p:nvSpPr>
+        <p:spPr>
+          <a:xfrm>
+            <a:off x="3259834" y="3569003"/>
+            <a:ext cx="1690660" cy="338554"/>
+          </a:xfrm>
+          <a:prstGeom prst="rect">
+            <a:avLst/>
+          </a:prstGeom>
+          <a:noFill/>
+        </p:spPr>
+        <p:txBody>
+          <a:bodyPr wrap="square" rtlCol="0">
+            <a:spAutoFit/>
+          </a:bodyPr>
+          <a:lstStyle/>
+          <a:p>
+            <a:r>
+              <a:rPr lang="pt-BR" sz="1600" dirty="0"/>
+              <a:t>TIPO DE LEITURA:</a:t>
+            </a:r>
+            <a:endParaRPr lang="en-US" sz="1600" dirty="0"/>
+          </a:p>
+        </p:txBody>
+      </p:sp>
+      <p:sp>
+        <p:nvSpPr>
+          <p:cNvPr id="6" name="CaixaDeTexto 5">
+            <a:extLst>
+              <a:ext uri="{FF2B5EF4-FFF2-40B4-BE49-F238E27FC236}">
+                <a16:creationId xmlns:a16="http://schemas.microsoft.com/office/drawing/2014/main" id="{E79AD3A7-FC84-47EF-B45C-943E8C2EF20F}"/>
+              </a:ext>
+            </a:extLst>
+          </p:cNvPr>
+          <p:cNvSpPr txBox="1"/>
+          <p:nvPr/>
+        </p:nvSpPr>
+        <p:spPr>
+          <a:xfrm>
+            <a:off x="3993258" y="3963964"/>
+            <a:ext cx="911434" cy="338554"/>
+          </a:xfrm>
+          <a:prstGeom prst="rect">
+            <a:avLst/>
+          </a:prstGeom>
+          <a:noFill/>
+        </p:spPr>
+        <p:txBody>
+          <a:bodyPr wrap="square" rtlCol="0">
+            <a:spAutoFit/>
+          </a:bodyPr>
+          <a:lstStyle/>
+          <a:p>
+            <a:r>
+              <a:rPr lang="pt-BR" sz="1600" dirty="0"/>
+              <a:t>OFF SET:</a:t>
+            </a:r>
+            <a:endParaRPr lang="en-US" sz="1600" dirty="0"/>
+          </a:p>
+        </p:txBody>
+      </p:sp>
+      <p:sp>
+        <p:nvSpPr>
+          <p:cNvPr id="9" name="CaixaDeTexto 8">
+            <a:extLst>
+              <a:ext uri="{FF2B5EF4-FFF2-40B4-BE49-F238E27FC236}">
+                <a16:creationId xmlns:a16="http://schemas.microsoft.com/office/drawing/2014/main" id="{9744C0A6-8F9D-4A30-BD9D-402AE2AAC297}"/>
+              </a:ext>
+            </a:extLst>
+          </p:cNvPr>
+          <p:cNvSpPr txBox="1"/>
+          <p:nvPr/>
+        </p:nvSpPr>
+        <p:spPr>
+          <a:xfrm>
+            <a:off x="3095625" y="3160005"/>
+            <a:ext cx="1809067" cy="338554"/>
+          </a:xfrm>
+          <a:prstGeom prst="rect">
+            <a:avLst/>
+          </a:prstGeom>
+          <a:noFill/>
+        </p:spPr>
+        <p:txBody>
+          <a:bodyPr wrap="square" rtlCol="0">
+            <a:spAutoFit/>
+          </a:bodyPr>
+          <a:lstStyle/>
+          <a:p>
+            <a:r>
+              <a:rPr lang="pt-BR" sz="1600" dirty="0"/>
+              <a:t>NOME DO SENSOR:</a:t>
+            </a:r>
+            <a:endParaRPr lang="en-US" sz="1600" dirty="0"/>
+          </a:p>
+        </p:txBody>
+      </p:sp>
+      <p:sp>
+        <p:nvSpPr>
+          <p:cNvPr id="14" name="CaixaDeTexto 13">
+            <a:extLst>
+              <a:ext uri="{FF2B5EF4-FFF2-40B4-BE49-F238E27FC236}">
+                <a16:creationId xmlns:a16="http://schemas.microsoft.com/office/drawing/2014/main" id="{A2089243-32A9-4A2E-96E8-BA5B555E139C}"/>
+              </a:ext>
+            </a:extLst>
+          </p:cNvPr>
+          <p:cNvSpPr txBox="1"/>
+          <p:nvPr/>
+        </p:nvSpPr>
+        <p:spPr>
+          <a:xfrm>
+            <a:off x="5659691" y="3578611"/>
+            <a:ext cx="505267" cy="338554"/>
+          </a:xfrm>
+          <a:prstGeom prst="rect">
+            <a:avLst/>
+          </a:prstGeom>
+          <a:noFill/>
+        </p:spPr>
+        <p:txBody>
+          <a:bodyPr wrap="square" rtlCol="0">
+            <a:spAutoFit/>
+          </a:bodyPr>
+          <a:lstStyle/>
+          <a:p>
+            <a:r>
+              <a:rPr lang="pt-BR" sz="1600" dirty="0"/>
+              <a:t>°C</a:t>
+            </a:r>
+            <a:endParaRPr lang="en-US" sz="1600" dirty="0"/>
+          </a:p>
+        </p:txBody>
+      </p:sp>
+      <p:sp>
+        <p:nvSpPr>
+          <p:cNvPr id="15" name="CaixaDeTexto 14">
+            <a:extLst>
+              <a:ext uri="{FF2B5EF4-FFF2-40B4-BE49-F238E27FC236}">
+                <a16:creationId xmlns:a16="http://schemas.microsoft.com/office/drawing/2014/main" id="{5DA468F6-98C6-448A-AF17-0F3A4C4F910A}"/>
+              </a:ext>
+            </a:extLst>
+          </p:cNvPr>
+          <p:cNvSpPr txBox="1"/>
+          <p:nvPr/>
+        </p:nvSpPr>
+        <p:spPr>
+          <a:xfrm>
+            <a:off x="7169448" y="3569003"/>
+            <a:ext cx="348172" cy="338554"/>
+          </a:xfrm>
+          <a:prstGeom prst="rect">
+            <a:avLst/>
+          </a:prstGeom>
+          <a:noFill/>
+        </p:spPr>
+        <p:txBody>
+          <a:bodyPr wrap="none" rtlCol="0">
+            <a:spAutoFit/>
+          </a:bodyPr>
+          <a:lstStyle/>
+          <a:p>
+            <a:r>
+              <a:rPr lang="pt-BR" sz="1600" dirty="0" err="1"/>
+              <a:t>°F</a:t>
+            </a:r>
+            <a:endParaRPr lang="en-US" sz="1600" dirty="0"/>
+          </a:p>
+        </p:txBody>
+      </p:sp>
+      <p:sp>
+        <p:nvSpPr>
+          <p:cNvPr id="16" name="Fluxograma: Conector 15">
+            <a:extLst>
+              <a:ext uri="{FF2B5EF4-FFF2-40B4-BE49-F238E27FC236}">
+                <a16:creationId xmlns:a16="http://schemas.microsoft.com/office/drawing/2014/main" id="{1FFED046-3F0D-41F2-BE43-78F80F1C0A0E}"/>
+              </a:ext>
+            </a:extLst>
+          </p:cNvPr>
+          <p:cNvSpPr/>
+          <p:nvPr/>
+        </p:nvSpPr>
+        <p:spPr>
+          <a:xfrm>
+            <a:off x="5430129" y="3625683"/>
+            <a:ext cx="248418" cy="230646"/>
+          </a:xfrm>
+          <a:prstGeom prst="flowChartConnector">
+            <a:avLst/>
+          </a:prstGeom>
+          <a:solidFill>
+            <a:schemeClr val="tx1"/>
+          </a:solidFill>
+          <a:effectLst>
+            <a:softEdge rad="31750"/>
+          </a:effectLst>
+        </p:spPr>
+        <p:style>
+          <a:lnRef idx="2">
+            <a:schemeClr val="accent1">
+              <a:shade val="50000"/>
+            </a:schemeClr>
+          </a:lnRef>
+          <a:fillRef idx="1">
+            <a:schemeClr val="accent1"/>
+          </a:fillRef>
+          <a:effectRef idx="0">
+            <a:schemeClr val="accent1"/>
+          </a:effectRef>
+          <a:fontRef idx="minor">
+            <a:schemeClr val="lt1"/>
+          </a:fontRef>
+        </p:style>
+        <p:txBody>
+          <a:bodyPr rot="0" spcFirstLastPara="0" vertOverflow="overflow" horzOverflow="overflow" vert="horz" wrap="square" lIns="91440" tIns="45720" rIns="91440" bIns="45720" numCol="1" spcCol="0" rtlCol="0" fromWordArt="0" anchor="ctr" anchorCtr="0" forceAA="0" compatLnSpc="1">
+            <a:prstTxWarp prst="textNoShape">
+              <a:avLst/>
+            </a:prstTxWarp>
+            <a:noAutofit/>
+          </a:bodyPr>
+          <a:lstStyle/>
+          <a:p>
+            <a:pPr algn="ctr"/>
+            <a:endParaRPr lang="en-US"/>
+          </a:p>
+        </p:txBody>
+      </p:sp>
+      <p:sp>
+        <p:nvSpPr>
+          <p:cNvPr id="17" name="Fluxograma: Conector 16">
+            <a:extLst>
+              <a:ext uri="{FF2B5EF4-FFF2-40B4-BE49-F238E27FC236}">
+                <a16:creationId xmlns:a16="http://schemas.microsoft.com/office/drawing/2014/main" id="{54A9D5E0-B26D-442B-AB6F-2597594CFA8E}"/>
+              </a:ext>
+            </a:extLst>
+          </p:cNvPr>
+          <p:cNvSpPr/>
+          <p:nvPr/>
+        </p:nvSpPr>
+        <p:spPr>
+          <a:xfrm>
+            <a:off x="6960085" y="3634653"/>
+            <a:ext cx="248418" cy="230646"/>
+          </a:xfrm>
+          <a:prstGeom prst="flowChartConnector">
+            <a:avLst/>
+          </a:prstGeom>
+          <a:solidFill>
+            <a:schemeClr val="bg1"/>
+          </a:solidFill>
+          <a:ln w="38100">
+            <a:solidFill>
+              <a:schemeClr val="tx1"/>
+            </a:solidFill>
+          </a:ln>
+          <a:effectLst>
+            <a:softEdge rad="31750"/>
+          </a:effectLst>
+        </p:spPr>
+        <p:style>
+          <a:lnRef idx="2">
+            <a:schemeClr val="accent1">
+              <a:shade val="50000"/>
+            </a:schemeClr>
+          </a:lnRef>
+          <a:fillRef idx="1">
+            <a:schemeClr val="accent1"/>
+          </a:fillRef>
+          <a:effectRef idx="0">
+            <a:schemeClr val="accent1"/>
+          </a:effectRef>
+          <a:fontRef idx="minor">
+            <a:schemeClr val="lt1"/>
+          </a:fontRef>
+        </p:style>
+        <p:txBody>
+          <a:bodyPr rot="0" spcFirstLastPara="0" vertOverflow="overflow" horzOverflow="overflow" vert="horz" wrap="square" lIns="91440" tIns="45720" rIns="91440" bIns="45720" numCol="1" spcCol="0" rtlCol="0" fromWordArt="0" anchor="ctr" anchorCtr="0" forceAA="0" compatLnSpc="1">
+            <a:prstTxWarp prst="textNoShape">
+              <a:avLst/>
+            </a:prstTxWarp>
+            <a:noAutofit/>
+          </a:bodyPr>
+          <a:lstStyle/>
+          <a:p>
+            <a:pPr algn="ctr"/>
+            <a:endParaRPr lang="en-US"/>
+          </a:p>
+        </p:txBody>
+      </p:sp>
+      <p:sp>
+        <p:nvSpPr>
+          <p:cNvPr id="18" name="Botão de Ação: Apagar 17">
+            <a:hlinkClick r:id="" action="ppaction://noaction" highlightClick="1"/>
+            <a:extLst>
+              <a:ext uri="{FF2B5EF4-FFF2-40B4-BE49-F238E27FC236}">
+                <a16:creationId xmlns:a16="http://schemas.microsoft.com/office/drawing/2014/main" id="{F72C3936-2A9A-4A4F-A427-8C13D4B6DEE9}"/>
+              </a:ext>
+            </a:extLst>
+          </p:cNvPr>
+          <p:cNvSpPr/>
+          <p:nvPr/>
+        </p:nvSpPr>
+        <p:spPr>
+          <a:xfrm>
+            <a:off x="4952782" y="3190307"/>
+            <a:ext cx="5200868" cy="277950"/>
+          </a:xfrm>
+          <a:prstGeom prst="actionButtonBlank">
+            <a:avLst/>
+          </a:prstGeom>
+          <a:solidFill>
+            <a:schemeClr val="bg1"/>
+          </a:solidFill>
+          <a:effectLst>
+            <a:softEdge rad="31750"/>
+          </a:effectLst>
+        </p:spPr>
+        <p:style>
+          <a:lnRef idx="2">
+            <a:schemeClr val="accent1">
+              <a:shade val="50000"/>
+            </a:schemeClr>
+          </a:lnRef>
+          <a:fillRef idx="1">
+            <a:schemeClr val="accent1"/>
+          </a:fillRef>
+          <a:effectRef idx="0">
+            <a:schemeClr val="accent1"/>
+          </a:effectRef>
+          <a:fontRef idx="minor">
+            <a:schemeClr val="lt1"/>
+          </a:fontRef>
+        </p:style>
+        <p:txBody>
+          <a:bodyPr rot="0" spcFirstLastPara="0" vertOverflow="overflow" horzOverflow="overflow" vert="horz" wrap="square" lIns="91440" tIns="45720" rIns="91440" bIns="45720" numCol="1" spcCol="0" rtlCol="0" fromWordArt="0" anchor="ctr" anchorCtr="0" forceAA="0" compatLnSpc="1">
+            <a:prstTxWarp prst="textNoShape">
+              <a:avLst/>
+            </a:prstTxWarp>
+            <a:noAutofit/>
+          </a:bodyPr>
+          <a:lstStyle/>
+          <a:p>
+            <a:pPr algn="ctr"/>
+            <a:endParaRPr lang="en-US"/>
+          </a:p>
+        </p:txBody>
+      </p:sp>
+      <p:sp>
+        <p:nvSpPr>
+          <p:cNvPr id="19" name="Retângulo 18">
+            <a:hlinkClick r:id="rId3" action="ppaction://hlinksldjump"/>
+            <a:extLst>
+              <a:ext uri="{FF2B5EF4-FFF2-40B4-BE49-F238E27FC236}">
+                <a16:creationId xmlns:a16="http://schemas.microsoft.com/office/drawing/2014/main" id="{4023C447-EEE5-4474-B2AB-345C8D86C977}"/>
+              </a:ext>
+            </a:extLst>
+          </p:cNvPr>
+          <p:cNvSpPr/>
+          <p:nvPr/>
+        </p:nvSpPr>
+        <p:spPr>
+          <a:xfrm>
+            <a:off x="3584797" y="5846058"/>
+            <a:ext cx="1857375" cy="742950"/>
+          </a:xfrm>
+          <a:prstGeom prst="rect">
+            <a:avLst/>
+          </a:prstGeom>
+          <a:effectLst>
+            <a:softEdge rad="31750"/>
+          </a:effectLst>
+        </p:spPr>
+        <p:style>
+          <a:lnRef idx="2">
+            <a:schemeClr val="accent1">
+              <a:shade val="50000"/>
+            </a:schemeClr>
+          </a:lnRef>
+          <a:fillRef idx="1">
+            <a:schemeClr val="accent1"/>
+          </a:fillRef>
+          <a:effectRef idx="0">
+            <a:schemeClr val="accent1"/>
+          </a:effectRef>
+          <a:fontRef idx="minor">
+            <a:schemeClr val="lt1"/>
+          </a:fontRef>
+        </p:style>
+        <p:txBody>
+          <a:bodyPr rot="0" spcFirstLastPara="0" vertOverflow="overflow" horzOverflow="overflow" vert="horz" wrap="square" lIns="91440" tIns="45720" rIns="91440" bIns="45720" numCol="1" spcCol="0" rtlCol="0" fromWordArt="0" anchor="ctr" anchorCtr="0" forceAA="0" compatLnSpc="1">
+            <a:prstTxWarp prst="textNoShape">
+              <a:avLst/>
+            </a:prstTxWarp>
+            <a:noAutofit/>
+          </a:bodyPr>
+          <a:lstStyle/>
+          <a:p>
+            <a:pPr algn="ctr"/>
+            <a:r>
+              <a:rPr lang="pt-BR" dirty="0"/>
+              <a:t>CONFIRMAR</a:t>
+            </a:r>
+            <a:endParaRPr lang="en-US" dirty="0"/>
+          </a:p>
+        </p:txBody>
+      </p:sp>
+      <p:sp>
+        <p:nvSpPr>
+          <p:cNvPr id="20" name="Retângulo 19">
+            <a:hlinkClick r:id="rId3" action="ppaction://hlinksldjump"/>
+            <a:extLst>
+              <a:ext uri="{FF2B5EF4-FFF2-40B4-BE49-F238E27FC236}">
+                <a16:creationId xmlns:a16="http://schemas.microsoft.com/office/drawing/2014/main" id="{2D2727EB-0BC3-4B7F-9C43-7F5F0645E177}"/>
+              </a:ext>
+            </a:extLst>
+          </p:cNvPr>
+          <p:cNvSpPr/>
+          <p:nvPr/>
+        </p:nvSpPr>
+        <p:spPr>
+          <a:xfrm>
+            <a:off x="7177029" y="5846058"/>
+            <a:ext cx="1857375" cy="742950"/>
+          </a:xfrm>
+          <a:prstGeom prst="rect">
+            <a:avLst/>
+          </a:prstGeom>
+          <a:effectLst>
+            <a:softEdge rad="31750"/>
+          </a:effectLst>
+        </p:spPr>
+        <p:style>
+          <a:lnRef idx="2">
+            <a:schemeClr val="accent1">
+              <a:shade val="50000"/>
+            </a:schemeClr>
+          </a:lnRef>
+          <a:fillRef idx="1">
+            <a:schemeClr val="accent1"/>
+          </a:fillRef>
+          <a:effectRef idx="0">
+            <a:schemeClr val="accent1"/>
+          </a:effectRef>
+          <a:fontRef idx="minor">
+            <a:schemeClr val="lt1"/>
+          </a:fontRef>
+        </p:style>
+        <p:txBody>
+          <a:bodyPr rot="0" spcFirstLastPara="0" vertOverflow="overflow" horzOverflow="overflow" vert="horz" wrap="square" lIns="91440" tIns="45720" rIns="91440" bIns="45720" numCol="1" spcCol="0" rtlCol="0" fromWordArt="0" anchor="ctr" anchorCtr="0" forceAA="0" compatLnSpc="1">
+            <a:prstTxWarp prst="textNoShape">
+              <a:avLst/>
+            </a:prstTxWarp>
+            <a:noAutofit/>
+          </a:bodyPr>
+          <a:lstStyle/>
+          <a:p>
+            <a:pPr algn="ctr"/>
+            <a:r>
+              <a:rPr lang="pt-BR" dirty="0"/>
+              <a:t>VOLTAR</a:t>
+            </a:r>
+            <a:endParaRPr lang="en-US" dirty="0"/>
+          </a:p>
+        </p:txBody>
+      </p:sp>
+      <p:sp>
+        <p:nvSpPr>
+          <p:cNvPr id="21" name="CaixaDeTexto 20">
+            <a:extLst>
+              <a:ext uri="{FF2B5EF4-FFF2-40B4-BE49-F238E27FC236}">
+                <a16:creationId xmlns:a16="http://schemas.microsoft.com/office/drawing/2014/main" id="{53AC77DA-D187-4436-B292-8F9B06DC241D}"/>
+              </a:ext>
+            </a:extLst>
+          </p:cNvPr>
+          <p:cNvSpPr txBox="1"/>
+          <p:nvPr/>
+        </p:nvSpPr>
+        <p:spPr>
+          <a:xfrm>
+            <a:off x="5105400" y="3958564"/>
+            <a:ext cx="4972050" cy="338554"/>
+          </a:xfrm>
+          <a:prstGeom prst="rect">
+            <a:avLst/>
+          </a:prstGeom>
+          <a:noFill/>
+        </p:spPr>
+        <p:txBody>
+          <a:bodyPr wrap="square" rtlCol="0">
+            <a:spAutoFit/>
+          </a:bodyPr>
+          <a:lstStyle/>
+          <a:p>
+            <a:r>
+              <a:rPr lang="pt-BR" sz="1600" dirty="0"/>
+              <a:t>-100 |------------------------------|------------------------------|100</a:t>
+            </a:r>
+            <a:endParaRPr lang="en-US" sz="1600" dirty="0"/>
+          </a:p>
+        </p:txBody>
+      </p:sp>
+      <p:sp>
+        <p:nvSpPr>
+          <p:cNvPr id="22" name="CaixaDeTexto 21">
+            <a:extLst>
+              <a:ext uri="{FF2B5EF4-FFF2-40B4-BE49-F238E27FC236}">
+                <a16:creationId xmlns:a16="http://schemas.microsoft.com/office/drawing/2014/main" id="{88AA7598-6B5D-4D70-BAF6-63E13960DEC7}"/>
+              </a:ext>
+            </a:extLst>
+          </p:cNvPr>
+          <p:cNvSpPr txBox="1"/>
+          <p:nvPr/>
+        </p:nvSpPr>
+        <p:spPr>
+          <a:xfrm>
+            <a:off x="7177029" y="4335818"/>
+            <a:ext cx="871596" cy="338554"/>
+          </a:xfrm>
+          <a:prstGeom prst="rect">
+            <a:avLst/>
+          </a:prstGeom>
+          <a:solidFill>
+            <a:schemeClr val="bg1"/>
+          </a:solidFill>
+        </p:spPr>
+        <p:txBody>
+          <a:bodyPr wrap="square" rtlCol="0">
+            <a:spAutoFit/>
+          </a:bodyPr>
+          <a:lstStyle/>
+          <a:p>
+            <a:r>
+              <a:rPr lang="pt-BR" sz="1600" dirty="0"/>
+              <a:t>      0</a:t>
+            </a:r>
+            <a:endParaRPr lang="en-US" sz="1600" dirty="0"/>
+          </a:p>
+        </p:txBody>
+      </p:sp>
     </p:spTree>
     <p:extLst>
       <p:ext uri="{BB962C8B-B14F-4D97-AF65-F5344CB8AC3E}">
-        <p14:creationId xmlns:p14="http://schemas.microsoft.com/office/powerpoint/2010/main" val="2720042247"/>
+        <p14:creationId xmlns:p14="http://schemas.microsoft.com/office/powerpoint/2010/main" val="1310750882"/>
       </p:ext>
     </p:extLst>
   </p:cSld>
@@ -4707,6 +6172,16 @@
 <file path=ppt/slides/slide6.xml><?xml version="1.0" encoding="utf-8"?>
 <p:sld xmlns:a="http://schemas.openxmlformats.org/drawingml/2006/main" xmlns:r="http://schemas.openxmlformats.org/officeDocument/2006/relationships" xmlns:p="http://schemas.openxmlformats.org/presentationml/2006/main">
   <p:cSld>
+    <p:bg>
+      <p:bgPr>
+        <a:solidFill>
+          <a:schemeClr val="bg1">
+            <a:lumMod val="95000"/>
+          </a:schemeClr>
+        </a:solidFill>
+        <a:effectLst/>
+      </p:bgPr>
+    </p:bg>
     <p:spTree>
       <p:nvGrpSpPr>
         <p:cNvPr id="1" name=""/>
@@ -4721,12 +6196,260 @@
           <a:chExt cx="0" cy="0"/>
         </a:xfrm>
       </p:grpSpPr>
+      <p:sp>
+        <p:nvSpPr>
+          <p:cNvPr id="6" name="Retângulo: Cantos Arredondados 5">
+            <a:extLst>
+              <a:ext uri="{FF2B5EF4-FFF2-40B4-BE49-F238E27FC236}">
+                <a16:creationId xmlns:a16="http://schemas.microsoft.com/office/drawing/2014/main" id="{398C372E-240E-4DA4-B758-17B8AA3E3BD4}"/>
+              </a:ext>
+            </a:extLst>
+          </p:cNvPr>
+          <p:cNvSpPr/>
+          <p:nvPr/>
+        </p:nvSpPr>
+        <p:spPr>
+          <a:xfrm>
+            <a:off x="4162926" y="2880000"/>
+            <a:ext cx="3866147" cy="2064505"/>
+          </a:xfrm>
+          <a:prstGeom prst="roundRect">
+            <a:avLst/>
+          </a:prstGeom>
+          <a:solidFill>
+            <a:schemeClr val="bg1">
+              <a:lumMod val="65000"/>
+            </a:schemeClr>
+          </a:solidFill>
+          <a:effectLst>
+            <a:softEdge rad="31750"/>
+          </a:effectLst>
+        </p:spPr>
+        <p:style>
+          <a:lnRef idx="2">
+            <a:schemeClr val="accent1">
+              <a:shade val="50000"/>
+            </a:schemeClr>
+          </a:lnRef>
+          <a:fillRef idx="1">
+            <a:schemeClr val="accent1"/>
+          </a:fillRef>
+          <a:effectRef idx="0">
+            <a:schemeClr val="accent1"/>
+          </a:effectRef>
+          <a:fontRef idx="minor">
+            <a:schemeClr val="lt1"/>
+          </a:fontRef>
+        </p:style>
+        <p:txBody>
+          <a:bodyPr rot="0" spcFirstLastPara="0" vertOverflow="overflow" horzOverflow="overflow" vert="horz" wrap="square" lIns="91440" tIns="45720" rIns="91440" bIns="45720" numCol="1" spcCol="0" rtlCol="0" fromWordArt="0" anchor="ctr" anchorCtr="0" forceAA="0" compatLnSpc="1">
+            <a:prstTxWarp prst="textNoShape">
+              <a:avLst/>
+            </a:prstTxWarp>
+            <a:noAutofit/>
+          </a:bodyPr>
+          <a:lstStyle/>
+          <a:p>
+            <a:pPr algn="ctr"/>
+            <a:endParaRPr lang="en-US" dirty="0"/>
+          </a:p>
+        </p:txBody>
+      </p:sp>
+      <p:sp>
+        <p:nvSpPr>
+          <p:cNvPr id="7" name="CaixaDeTexto 6">
+            <a:extLst>
+              <a:ext uri="{FF2B5EF4-FFF2-40B4-BE49-F238E27FC236}">
+                <a16:creationId xmlns:a16="http://schemas.microsoft.com/office/drawing/2014/main" id="{F32CEFB6-36BB-4B85-8F1D-F9BE23F7F4BC}"/>
+              </a:ext>
+            </a:extLst>
+          </p:cNvPr>
+          <p:cNvSpPr txBox="1"/>
+          <p:nvPr/>
+        </p:nvSpPr>
+        <p:spPr>
+          <a:xfrm>
+            <a:off x="4651213" y="3342210"/>
+            <a:ext cx="697832" cy="369332"/>
+          </a:xfrm>
+          <a:prstGeom prst="rect">
+            <a:avLst/>
+          </a:prstGeom>
+          <a:noFill/>
+        </p:spPr>
+        <p:txBody>
+          <a:bodyPr wrap="square" rtlCol="0">
+            <a:spAutoFit/>
+          </a:bodyPr>
+          <a:lstStyle/>
+          <a:p>
+            <a:r>
+              <a:rPr lang="pt-BR" dirty="0"/>
+              <a:t>Login</a:t>
+            </a:r>
+            <a:endParaRPr lang="en-US" dirty="0"/>
+          </a:p>
+        </p:txBody>
+      </p:sp>
+      <p:sp>
+        <p:nvSpPr>
+          <p:cNvPr id="8" name="CaixaDeTexto 7">
+            <a:extLst>
+              <a:ext uri="{FF2B5EF4-FFF2-40B4-BE49-F238E27FC236}">
+                <a16:creationId xmlns:a16="http://schemas.microsoft.com/office/drawing/2014/main" id="{1C7836BC-5BBE-4CA6-AB54-DF5089002D60}"/>
+              </a:ext>
+            </a:extLst>
+          </p:cNvPr>
+          <p:cNvSpPr txBox="1"/>
+          <p:nvPr/>
+        </p:nvSpPr>
+        <p:spPr>
+          <a:xfrm>
+            <a:off x="4592053" y="3727587"/>
+            <a:ext cx="756992" cy="369332"/>
+          </a:xfrm>
+          <a:prstGeom prst="rect">
+            <a:avLst/>
+          </a:prstGeom>
+          <a:noFill/>
+        </p:spPr>
+        <p:txBody>
+          <a:bodyPr wrap="square" rtlCol="0">
+            <a:spAutoFit/>
+          </a:bodyPr>
+          <a:lstStyle/>
+          <a:p>
+            <a:r>
+              <a:rPr lang="pt-BR" dirty="0"/>
+              <a:t>Senha</a:t>
+            </a:r>
+            <a:endParaRPr lang="en-US" dirty="0"/>
+          </a:p>
+        </p:txBody>
+      </p:sp>
+      <p:sp>
+        <p:nvSpPr>
+          <p:cNvPr id="12" name="Botão de Ação: Apagar 11">
+            <a:hlinkClick r:id="" action="ppaction://noaction" highlightClick="1"/>
+            <a:extLst>
+              <a:ext uri="{FF2B5EF4-FFF2-40B4-BE49-F238E27FC236}">
+                <a16:creationId xmlns:a16="http://schemas.microsoft.com/office/drawing/2014/main" id="{31796757-78B4-47E9-AEE2-263AFB18BAD6}"/>
+              </a:ext>
+            </a:extLst>
+          </p:cNvPr>
+          <p:cNvSpPr/>
+          <p:nvPr/>
+        </p:nvSpPr>
+        <p:spPr>
+          <a:xfrm>
+            <a:off x="5349045" y="3326165"/>
+            <a:ext cx="2266944" cy="274847"/>
+          </a:xfrm>
+          <a:prstGeom prst="actionButtonBlank">
+            <a:avLst/>
+          </a:prstGeom>
+          <a:solidFill>
+            <a:schemeClr val="bg1"/>
+          </a:solidFill>
+          <a:effectLst>
+            <a:softEdge rad="31750"/>
+          </a:effectLst>
+        </p:spPr>
+        <p:style>
+          <a:lnRef idx="2">
+            <a:schemeClr val="accent1">
+              <a:shade val="50000"/>
+            </a:schemeClr>
+          </a:lnRef>
+          <a:fillRef idx="1">
+            <a:schemeClr val="accent1"/>
+          </a:fillRef>
+          <a:effectRef idx="0">
+            <a:schemeClr val="accent1"/>
+          </a:effectRef>
+          <a:fontRef idx="minor">
+            <a:schemeClr val="lt1"/>
+          </a:fontRef>
+        </p:style>
+        <p:txBody>
+          <a:bodyPr rot="0" spcFirstLastPara="0" vertOverflow="overflow" horzOverflow="overflow" vert="horz" wrap="square" lIns="91440" tIns="45720" rIns="91440" bIns="45720" numCol="1" spcCol="0" rtlCol="0" fromWordArt="0" anchor="ctr" anchorCtr="0" forceAA="0" compatLnSpc="1">
+            <a:prstTxWarp prst="textNoShape">
+              <a:avLst/>
+            </a:prstTxWarp>
+            <a:noAutofit/>
+          </a:bodyPr>
+          <a:lstStyle/>
+          <a:p>
+            <a:pPr algn="ctr"/>
+            <a:endParaRPr lang="en-US"/>
+          </a:p>
+        </p:txBody>
+      </p:sp>
+      <p:sp>
+        <p:nvSpPr>
+          <p:cNvPr id="13" name="Botão de Ação: Apagar 12">
+            <a:hlinkClick r:id="" action="ppaction://noaction" highlightClick="1"/>
+            <a:extLst>
+              <a:ext uri="{FF2B5EF4-FFF2-40B4-BE49-F238E27FC236}">
+                <a16:creationId xmlns:a16="http://schemas.microsoft.com/office/drawing/2014/main" id="{4B1FB507-A09D-4CE9-91B7-870A942A93C5}"/>
+              </a:ext>
+            </a:extLst>
+          </p:cNvPr>
+          <p:cNvSpPr/>
+          <p:nvPr/>
+        </p:nvSpPr>
+        <p:spPr>
+          <a:xfrm>
+            <a:off x="5349045" y="3757458"/>
+            <a:ext cx="2266944" cy="258802"/>
+          </a:xfrm>
+          <a:prstGeom prst="actionButtonBlank">
+            <a:avLst/>
+          </a:prstGeom>
+          <a:solidFill>
+            <a:schemeClr val="bg1"/>
+          </a:solidFill>
+          <a:effectLst>
+            <a:softEdge rad="31750"/>
+          </a:effectLst>
+        </p:spPr>
+        <p:style>
+          <a:lnRef idx="2">
+            <a:schemeClr val="accent1">
+              <a:shade val="50000"/>
+            </a:schemeClr>
+          </a:lnRef>
+          <a:fillRef idx="1">
+            <a:schemeClr val="accent1"/>
+          </a:fillRef>
+          <a:effectRef idx="0">
+            <a:schemeClr val="accent1"/>
+          </a:effectRef>
+          <a:fontRef idx="minor">
+            <a:schemeClr val="lt1"/>
+          </a:fontRef>
+        </p:style>
+        <p:txBody>
+          <a:bodyPr rot="0" spcFirstLastPara="0" vertOverflow="overflow" horzOverflow="overflow" vert="horz" wrap="square" lIns="91440" tIns="45720" rIns="91440" bIns="45720" numCol="1" spcCol="0" rtlCol="0" fromWordArt="0" anchor="ctr" anchorCtr="0" forceAA="0" compatLnSpc="1">
+            <a:prstTxWarp prst="textNoShape">
+              <a:avLst/>
+            </a:prstTxWarp>
+            <a:noAutofit/>
+          </a:bodyPr>
+          <a:lstStyle/>
+          <a:p>
+            <a:pPr algn="ctr"/>
+            <a:endParaRPr lang="en-US"/>
+          </a:p>
+        </p:txBody>
+      </p:sp>
       <p:pic>
         <p:nvPicPr>
-          <p:cNvPr id="5" name="Imagem 4" descr="Logotipo, nome da empresa&#10;&#10;Descrição gerada automaticamente">
-            <a:extLst>
-              <a:ext uri="{FF2B5EF4-FFF2-40B4-BE49-F238E27FC236}">
-                <a16:creationId xmlns:a16="http://schemas.microsoft.com/office/drawing/2014/main" id="{30244375-3F3F-4273-B7AC-F643F29FC068}"/>
+          <p:cNvPr id="4" name="Imagem 3">
+            <a:hlinkClick r:id="rId2" action="ppaction://hlinksldjump"/>
+            <a:extLst>
+              <a:ext uri="{FF2B5EF4-FFF2-40B4-BE49-F238E27FC236}">
+                <a16:creationId xmlns:a16="http://schemas.microsoft.com/office/drawing/2014/main" id="{05A1EAB1-0282-42F4-8E32-F02458656373}"/>
               </a:ext>
             </a:extLst>
           </p:cNvPr>
@@ -4736,7 +6459,155 @@
           <p:nvPr/>
         </p:nvPicPr>
         <p:blipFill>
-          <a:blip r:embed="rId2">
+          <a:blip r:embed="rId3"/>
+          <a:stretch>
+            <a:fillRect/>
+          </a:stretch>
+        </p:blipFill>
+        <p:spPr>
+          <a:xfrm>
+            <a:off x="5541216" y="4172706"/>
+            <a:ext cx="1109568" cy="542591"/>
+          </a:xfrm>
+          <a:prstGeom prst="rect">
+            <a:avLst/>
+          </a:prstGeom>
+        </p:spPr>
+      </p:pic>
+      <p:sp>
+        <p:nvSpPr>
+          <p:cNvPr id="20" name="Retângulo 19">
+            <a:hlinkClick r:id="" action="ppaction://noaction"/>
+            <a:extLst>
+              <a:ext uri="{FF2B5EF4-FFF2-40B4-BE49-F238E27FC236}">
+                <a16:creationId xmlns:a16="http://schemas.microsoft.com/office/drawing/2014/main" id="{64F4D8D9-2377-4D73-824B-A0BB5DC69EDA}"/>
+              </a:ext>
+            </a:extLst>
+          </p:cNvPr>
+          <p:cNvSpPr/>
+          <p:nvPr/>
+        </p:nvSpPr>
+        <p:spPr>
+          <a:xfrm>
+            <a:off x="3584797" y="5846058"/>
+            <a:ext cx="1857375" cy="742950"/>
+          </a:xfrm>
+          <a:prstGeom prst="rect">
+            <a:avLst/>
+          </a:prstGeom>
+          <a:effectLst>
+            <a:softEdge rad="31750"/>
+          </a:effectLst>
+        </p:spPr>
+        <p:style>
+          <a:lnRef idx="2">
+            <a:schemeClr val="accent1">
+              <a:shade val="50000"/>
+            </a:schemeClr>
+          </a:lnRef>
+          <a:fillRef idx="1">
+            <a:schemeClr val="accent1"/>
+          </a:fillRef>
+          <a:effectRef idx="0">
+            <a:schemeClr val="accent1"/>
+          </a:effectRef>
+          <a:fontRef idx="minor">
+            <a:schemeClr val="lt1"/>
+          </a:fontRef>
+        </p:style>
+        <p:txBody>
+          <a:bodyPr rot="0" spcFirstLastPara="0" vertOverflow="overflow" horzOverflow="overflow" vert="horz" wrap="square" lIns="91440" tIns="45720" rIns="91440" bIns="45720" numCol="1" spcCol="0" rtlCol="0" fromWordArt="0" anchor="ctr" anchorCtr="0" forceAA="0" compatLnSpc="1">
+            <a:prstTxWarp prst="textNoShape">
+              <a:avLst/>
+            </a:prstTxWarp>
+            <a:noAutofit/>
+          </a:bodyPr>
+          <a:lstStyle/>
+          <a:p>
+            <a:pPr algn="ctr"/>
+            <a:r>
+              <a:rPr lang="pt-BR" dirty="0"/>
+              <a:t>programador</a:t>
+            </a:r>
+            <a:endParaRPr lang="en-US" dirty="0"/>
+          </a:p>
+        </p:txBody>
+      </p:sp>
+      <p:sp>
+        <p:nvSpPr>
+          <p:cNvPr id="21" name="Retângulo 20">
+            <a:hlinkClick r:id="" action="ppaction://noaction"/>
+            <a:extLst>
+              <a:ext uri="{FF2B5EF4-FFF2-40B4-BE49-F238E27FC236}">
+                <a16:creationId xmlns:a16="http://schemas.microsoft.com/office/drawing/2014/main" id="{381ACB82-8696-44F6-8BB7-E6ABE1A125F3}"/>
+              </a:ext>
+            </a:extLst>
+          </p:cNvPr>
+          <p:cNvSpPr/>
+          <p:nvPr/>
+        </p:nvSpPr>
+        <p:spPr>
+          <a:xfrm>
+            <a:off x="7177029" y="5846058"/>
+            <a:ext cx="1857375" cy="742950"/>
+          </a:xfrm>
+          <a:prstGeom prst="rect">
+            <a:avLst/>
+          </a:prstGeom>
+          <a:effectLst>
+            <a:softEdge rad="31750"/>
+          </a:effectLst>
+        </p:spPr>
+        <p:style>
+          <a:lnRef idx="2">
+            <a:schemeClr val="accent1">
+              <a:shade val="50000"/>
+            </a:schemeClr>
+          </a:lnRef>
+          <a:fillRef idx="1">
+            <a:schemeClr val="accent1"/>
+          </a:fillRef>
+          <a:effectRef idx="0">
+            <a:schemeClr val="accent1"/>
+          </a:effectRef>
+          <a:fontRef idx="minor">
+            <a:schemeClr val="lt1"/>
+          </a:fontRef>
+        </p:style>
+        <p:txBody>
+          <a:bodyPr rot="0" spcFirstLastPara="0" vertOverflow="overflow" horzOverflow="overflow" vert="horz" wrap="square" lIns="91440" tIns="45720" rIns="91440" bIns="45720" numCol="1" spcCol="0" rtlCol="0" fromWordArt="0" anchor="ctr" anchorCtr="0" forceAA="0" compatLnSpc="1">
+            <a:prstTxWarp prst="textNoShape">
+              <a:avLst/>
+            </a:prstTxWarp>
+            <a:noAutofit/>
+          </a:bodyPr>
+          <a:lstStyle/>
+          <a:p>
+            <a:pPr algn="ctr"/>
+            <a:r>
+              <a:rPr lang="pt-BR" dirty="0"/>
+              <a:t>informação</a:t>
+            </a:r>
+            <a:endParaRPr lang="en-US" dirty="0"/>
+          </a:p>
+        </p:txBody>
+      </p:sp>
+      <p:pic>
+        <p:nvPicPr>
+          <p:cNvPr id="5" name="Imagem 4" descr="Logotipo, nome da empresa&#10;&#10;Descrição gerada automaticamente">
+            <a:extLst>
+              <a:ext uri="{FF2B5EF4-FFF2-40B4-BE49-F238E27FC236}">
+                <a16:creationId xmlns:a16="http://schemas.microsoft.com/office/drawing/2014/main" id="{BF3B5722-7247-4046-8D48-0C164D135433}"/>
+              </a:ext>
+            </a:extLst>
+          </p:cNvPr>
+          <p:cNvPicPr>
+            <a:picLocks noChangeAspect="1"/>
+          </p:cNvPicPr>
+          <p:nvPr/>
+        </p:nvPicPr>
+        <p:blipFill>
+          <a:blip r:embed="rId4">
             <a:extLst>
               <a:ext uri="{28A0092B-C50C-407E-A947-70E740481C1C}">
                 <a14:useLocalDpi xmlns:a14="http://schemas.microsoft.com/office/drawing/2010/main" val="0"/>
@@ -4749,7 +6620,7 @@
         </p:blipFill>
         <p:spPr>
           <a:xfrm>
-            <a:off x="4033045" y="720000"/>
+            <a:off x="4162926" y="477301"/>
             <a:ext cx="4125910" cy="2160000"/>
           </a:xfrm>
           <a:prstGeom prst="rect">
@@ -4760,79 +6631,21 @@
     </p:spTree>
     <p:extLst>
       <p:ext uri="{BB962C8B-B14F-4D97-AF65-F5344CB8AC3E}">
-        <p14:creationId xmlns:p14="http://schemas.microsoft.com/office/powerpoint/2010/main" val="1310750882"/>
+        <p14:creationId xmlns:p14="http://schemas.microsoft.com/office/powerpoint/2010/main" val="1446936387"/>
       </p:ext>
     </p:extLst>
   </p:cSld>
   <p:clrMapOvr>
     <a:masterClrMapping/>
   </p:clrMapOvr>
-</p:sld>
-</file>
-
-<file path=ppt/slides/slide7.xml><?xml version="1.0" encoding="utf-8"?>
-<p:sld xmlns:a="http://schemas.openxmlformats.org/drawingml/2006/main" xmlns:r="http://schemas.openxmlformats.org/officeDocument/2006/relationships" xmlns:p="http://schemas.openxmlformats.org/presentationml/2006/main">
-  <p:cSld>
-    <p:spTree>
-      <p:nvGrpSpPr>
-        <p:cNvPr id="1" name=""/>
-        <p:cNvGrpSpPr/>
-        <p:nvPr/>
-      </p:nvGrpSpPr>
-      <p:grpSpPr>
-        <a:xfrm>
-          <a:off x="0" y="0"/>
-          <a:ext cx="0" cy="0"/>
-          <a:chOff x="0" y="0"/>
-          <a:chExt cx="0" cy="0"/>
-        </a:xfrm>
-      </p:grpSpPr>
-      <p:pic>
-        <p:nvPicPr>
-          <p:cNvPr id="5" name="Imagem 4" descr="Logotipo, nome da empresa&#10;&#10;Descrição gerada automaticamente">
-            <a:extLst>
-              <a:ext uri="{FF2B5EF4-FFF2-40B4-BE49-F238E27FC236}">
-                <a16:creationId xmlns:a16="http://schemas.microsoft.com/office/drawing/2014/main" id="{30244375-3F3F-4273-B7AC-F643F29FC068}"/>
-              </a:ext>
-            </a:extLst>
-          </p:cNvPr>
-          <p:cNvPicPr>
-            <a:picLocks noChangeAspect="1"/>
-          </p:cNvPicPr>
-          <p:nvPr/>
-        </p:nvPicPr>
-        <p:blipFill>
-          <a:blip r:embed="rId2">
-            <a:extLst>
-              <a:ext uri="{28A0092B-C50C-407E-A947-70E740481C1C}">
-                <a14:useLocalDpi xmlns:a14="http://schemas.microsoft.com/office/drawing/2010/main" val="0"/>
-              </a:ext>
-            </a:extLst>
-          </a:blip>
-          <a:stretch>
-            <a:fillRect/>
-          </a:stretch>
-        </p:blipFill>
-        <p:spPr>
-          <a:xfrm>
-            <a:off x="4033045" y="720000"/>
-            <a:ext cx="4125910" cy="2160000"/>
-          </a:xfrm>
-          <a:prstGeom prst="rect">
-            <a:avLst/>
-          </a:prstGeom>
-        </p:spPr>
-      </p:pic>
-    </p:spTree>
-    <p:extLst>
-      <p:ext uri="{BB962C8B-B14F-4D97-AF65-F5344CB8AC3E}">
-        <p14:creationId xmlns:p14="http://schemas.microsoft.com/office/powerpoint/2010/main" val="3144883357"/>
-      </p:ext>
-    </p:extLst>
-  </p:cSld>
-  <p:clrMapOvr>
-    <a:masterClrMapping/>
-  </p:clrMapOvr>
+  <mc:AlternateContent xmlns:mc="http://schemas.openxmlformats.org/markup-compatibility/2006" xmlns:p14="http://schemas.microsoft.com/office/powerpoint/2010/main">
+    <mc:Choice Requires="p14">
+      <p:transition spd="slow" p14:dur="2000" advClick="0"/>
+    </mc:Choice>
+    <mc:Fallback xmlns="">
+      <p:transition spd="slow" advClick="0"/>
+    </mc:Fallback>
+  </mc:AlternateContent>
 </p:sld>
 </file>
 

</xml_diff>